<commit_message>
Updated the latest deck
</commit_message>
<xml_diff>
--- a/Documents/MicroServices.pptx
+++ b/Documents/MicroServices.pptx
@@ -5,10 +5,10 @@
     <p:sldMasterId id="2147483660" r:id="rId1"/>
   </p:sldMasterIdLst>
   <p:notesMasterIdLst>
-    <p:notesMasterId r:id="rId37"/>
+    <p:notesMasterId r:id="rId56"/>
   </p:notesMasterIdLst>
   <p:handoutMasterIdLst>
-    <p:handoutMasterId r:id="rId38"/>
+    <p:handoutMasterId r:id="rId57"/>
   </p:handoutMasterIdLst>
   <p:sldIdLst>
     <p:sldId id="256" r:id="rId2"/>
@@ -46,6 +46,25 @@
     <p:sldId id="289" r:id="rId34"/>
     <p:sldId id="323" r:id="rId35"/>
     <p:sldId id="295" r:id="rId36"/>
+    <p:sldId id="324" r:id="rId37"/>
+    <p:sldId id="325" r:id="rId38"/>
+    <p:sldId id="326" r:id="rId39"/>
+    <p:sldId id="327" r:id="rId40"/>
+    <p:sldId id="328" r:id="rId41"/>
+    <p:sldId id="329" r:id="rId42"/>
+    <p:sldId id="330" r:id="rId43"/>
+    <p:sldId id="331" r:id="rId44"/>
+    <p:sldId id="332" r:id="rId45"/>
+    <p:sldId id="333" r:id="rId46"/>
+    <p:sldId id="334" r:id="rId47"/>
+    <p:sldId id="335" r:id="rId48"/>
+    <p:sldId id="336" r:id="rId49"/>
+    <p:sldId id="337" r:id="rId50"/>
+    <p:sldId id="338" r:id="rId51"/>
+    <p:sldId id="339" r:id="rId52"/>
+    <p:sldId id="340" r:id="rId53"/>
+    <p:sldId id="341" r:id="rId54"/>
+    <p:sldId id="342" r:id="rId55"/>
   </p:sldIdLst>
   <p:sldSz cx="12192000" cy="6858000"/>
   <p:notesSz cx="6858000" cy="9144000"/>
@@ -188,6 +207,25 @@
             <p14:sldId id="289"/>
             <p14:sldId id="323"/>
             <p14:sldId id="295"/>
+            <p14:sldId id="324"/>
+            <p14:sldId id="325"/>
+            <p14:sldId id="326"/>
+            <p14:sldId id="327"/>
+            <p14:sldId id="328"/>
+            <p14:sldId id="329"/>
+            <p14:sldId id="330"/>
+            <p14:sldId id="331"/>
+            <p14:sldId id="332"/>
+            <p14:sldId id="333"/>
+            <p14:sldId id="334"/>
+            <p14:sldId id="335"/>
+            <p14:sldId id="336"/>
+            <p14:sldId id="337"/>
+            <p14:sldId id="338"/>
+            <p14:sldId id="339"/>
+            <p14:sldId id="340"/>
+            <p14:sldId id="341"/>
+            <p14:sldId id="342"/>
           </p14:sldIdLst>
         </p14:section>
         <p14:section name="Learn More" id="{2CC34DB2-6590-42C0-AD4B-A04C6060184E}">
@@ -2646,715 +2684,6 @@
       <dsp:cNvGrpSpPr/>
     </dsp:nvGrpSpPr>
     <dsp:grpSpPr/>
-    <dsp:sp modelId="{740C31AB-CD61-4091-A7F4-94801C935247}">
-      <dsp:nvSpPr>
-        <dsp:cNvPr id="0" name=""/>
-        <dsp:cNvSpPr/>
-      </dsp:nvSpPr>
-      <dsp:spPr>
-        <a:xfrm>
-          <a:off x="2121229" y="2112"/>
-          <a:ext cx="1189585" cy="773230"/>
-        </a:xfrm>
-        <a:prstGeom prst="roundRect">
-          <a:avLst/>
-        </a:prstGeom>
-        <a:solidFill>
-          <a:schemeClr val="lt1">
-            <a:hueOff val="0"/>
-            <a:satOff val="0"/>
-            <a:lumOff val="0"/>
-            <a:alphaOff val="0"/>
-          </a:schemeClr>
-        </a:solidFill>
-        <a:ln w="12700" cap="flat" cmpd="sng" algn="ctr">
-          <a:solidFill>
-            <a:schemeClr val="accent2">
-              <a:shade val="80000"/>
-              <a:hueOff val="0"/>
-              <a:satOff val="0"/>
-              <a:lumOff val="0"/>
-              <a:alphaOff val="0"/>
-            </a:schemeClr>
-          </a:solidFill>
-          <a:prstDash val="solid"/>
-          <a:miter lim="800000"/>
-        </a:ln>
-        <a:effectLst/>
-      </dsp:spPr>
-      <dsp:style>
-        <a:lnRef idx="2">
-          <a:scrgbClr r="0" g="0" b="0"/>
-        </a:lnRef>
-        <a:fillRef idx="1">
-          <a:scrgbClr r="0" g="0" b="0"/>
-        </a:fillRef>
-        <a:effectRef idx="0">
-          <a:scrgbClr r="0" g="0" b="0"/>
-        </a:effectRef>
-        <a:fontRef idx="minor">
-          <a:schemeClr val="lt1"/>
-        </a:fontRef>
-      </dsp:style>
-      <dsp:txBody>
-        <a:bodyPr spcFirstLastPara="0" vert="horz" wrap="square" lIns="83820" tIns="83820" rIns="83820" bIns="83820" numCol="1" spcCol="1270" anchor="ctr" anchorCtr="0">
-          <a:noAutofit/>
-        </a:bodyPr>
-        <a:lstStyle/>
-        <a:p>
-          <a:pPr lvl="0" algn="ctr" defTabSz="977900">
-            <a:lnSpc>
-              <a:spcPct val="90000"/>
-            </a:lnSpc>
-            <a:spcBef>
-              <a:spcPct val="0"/>
-            </a:spcBef>
-            <a:spcAft>
-              <a:spcPct val="35000"/>
-            </a:spcAft>
-          </a:pPr>
-          <a:r>
-            <a:rPr lang="en-US" sz="2200" kern="1200" dirty="0">
-              <a:solidFill>
-                <a:srgbClr val="D24726"/>
-              </a:solidFill>
-              <a:latin typeface="Segoe UI Light" panose="020B0502040204020203" pitchFamily="34" charset="0"/>
-              <a:ea typeface="+mj-ea"/>
-              <a:cs typeface="Segoe UI Light" panose="020B0502040204020203" pitchFamily="34" charset="0"/>
-            </a:rPr>
-            <a:t>Node1</a:t>
-          </a:r>
-        </a:p>
-      </dsp:txBody>
-      <dsp:txXfrm>
-        <a:off x="2158975" y="39858"/>
-        <a:ext cx="1114093" cy="697738"/>
-      </dsp:txXfrm>
-    </dsp:sp>
-    <dsp:sp modelId="{08DABA05-CEAC-485A-A851-23F8BDF2537F}">
-      <dsp:nvSpPr>
-        <dsp:cNvPr id="0" name=""/>
-        <dsp:cNvSpPr/>
-      </dsp:nvSpPr>
-      <dsp:spPr>
-        <a:xfrm>
-          <a:off x="1172135" y="388727"/>
-          <a:ext cx="3087772" cy="3087772"/>
-        </a:xfrm>
-        <a:custGeom>
-          <a:avLst/>
-          <a:gdLst/>
-          <a:ahLst/>
-          <a:cxnLst/>
-          <a:rect l="0" t="0" r="0" b="0"/>
-          <a:pathLst>
-            <a:path>
-              <a:moveTo>
-                <a:pt x="2146839" y="122607"/>
-              </a:moveTo>
-              <a:arcTo wR="1543886" hR="1543886" stAng="17579295" swAng="1959991"/>
-            </a:path>
-          </a:pathLst>
-        </a:custGeom>
-        <a:noFill/>
-        <a:ln w="6350" cap="flat" cmpd="sng" algn="ctr">
-          <a:solidFill>
-            <a:schemeClr val="accent2">
-              <a:hueOff val="0"/>
-              <a:satOff val="0"/>
-              <a:lumOff val="0"/>
-              <a:alphaOff val="0"/>
-            </a:schemeClr>
-          </a:solidFill>
-          <a:prstDash val="solid"/>
-          <a:miter lim="800000"/>
-        </a:ln>
-        <a:effectLst/>
-      </dsp:spPr>
-      <dsp:style>
-        <a:lnRef idx="1">
-          <a:scrgbClr r="0" g="0" b="0"/>
-        </a:lnRef>
-        <a:fillRef idx="0">
-          <a:scrgbClr r="0" g="0" b="0"/>
-        </a:fillRef>
-        <a:effectRef idx="0">
-          <a:scrgbClr r="0" g="0" b="0"/>
-        </a:effectRef>
-        <a:fontRef idx="minor"/>
-      </dsp:style>
-    </dsp:sp>
-    <dsp:sp modelId="{7A95ADEE-1A3D-44F5-9024-A7ABA55FFBC3}">
-      <dsp:nvSpPr>
-        <dsp:cNvPr id="0" name=""/>
-        <dsp:cNvSpPr/>
-      </dsp:nvSpPr>
-      <dsp:spPr>
-        <a:xfrm>
-          <a:off x="3589552" y="1068911"/>
-          <a:ext cx="1189585" cy="773230"/>
-        </a:xfrm>
-        <a:prstGeom prst="roundRect">
-          <a:avLst/>
-        </a:prstGeom>
-        <a:solidFill>
-          <a:schemeClr val="lt1">
-            <a:hueOff val="0"/>
-            <a:satOff val="0"/>
-            <a:lumOff val="0"/>
-            <a:alphaOff val="0"/>
-          </a:schemeClr>
-        </a:solidFill>
-        <a:ln w="12700" cap="flat" cmpd="sng" algn="ctr">
-          <a:solidFill>
-            <a:schemeClr val="accent2">
-              <a:shade val="80000"/>
-              <a:hueOff val="0"/>
-              <a:satOff val="0"/>
-              <a:lumOff val="0"/>
-              <a:alphaOff val="0"/>
-            </a:schemeClr>
-          </a:solidFill>
-          <a:prstDash val="solid"/>
-          <a:miter lim="800000"/>
-        </a:ln>
-        <a:effectLst/>
-      </dsp:spPr>
-      <dsp:style>
-        <a:lnRef idx="2">
-          <a:scrgbClr r="0" g="0" b="0"/>
-        </a:lnRef>
-        <a:fillRef idx="1">
-          <a:scrgbClr r="0" g="0" b="0"/>
-        </a:fillRef>
-        <a:effectRef idx="0">
-          <a:scrgbClr r="0" g="0" b="0"/>
-        </a:effectRef>
-        <a:fontRef idx="minor">
-          <a:schemeClr val="lt1"/>
-        </a:fontRef>
-      </dsp:style>
-      <dsp:txBody>
-        <a:bodyPr spcFirstLastPara="0" vert="horz" wrap="square" lIns="83820" tIns="83820" rIns="83820" bIns="83820" numCol="1" spcCol="1270" anchor="ctr" anchorCtr="0">
-          <a:noAutofit/>
-        </a:bodyPr>
-        <a:lstStyle/>
-        <a:p>
-          <a:pPr lvl="0" algn="ctr" defTabSz="977900">
-            <a:lnSpc>
-              <a:spcPct val="90000"/>
-            </a:lnSpc>
-            <a:spcBef>
-              <a:spcPct val="0"/>
-            </a:spcBef>
-            <a:spcAft>
-              <a:spcPct val="35000"/>
-            </a:spcAft>
-          </a:pPr>
-          <a:r>
-            <a:rPr lang="en-US" sz="2200" kern="1200" dirty="0">
-              <a:solidFill>
-                <a:srgbClr val="D24726"/>
-              </a:solidFill>
-              <a:latin typeface="Segoe UI Light" panose="020B0502040204020203" pitchFamily="34" charset="0"/>
-              <a:ea typeface="+mj-ea"/>
-              <a:cs typeface="Segoe UI Light" panose="020B0502040204020203" pitchFamily="34" charset="0"/>
-            </a:rPr>
-            <a:t>Node 2</a:t>
-          </a:r>
-        </a:p>
-      </dsp:txBody>
-      <dsp:txXfrm>
-        <a:off x="3627298" y="1106657"/>
-        <a:ext cx="1114093" cy="697738"/>
-      </dsp:txXfrm>
-    </dsp:sp>
-    <dsp:sp modelId="{99B7FB11-2FAC-43CD-B14D-4629F64D6038}">
-      <dsp:nvSpPr>
-        <dsp:cNvPr id="0" name=""/>
-        <dsp:cNvSpPr/>
-      </dsp:nvSpPr>
-      <dsp:spPr>
-        <a:xfrm>
-          <a:off x="1172135" y="388727"/>
-          <a:ext cx="3087772" cy="3087772"/>
-        </a:xfrm>
-        <a:custGeom>
-          <a:avLst/>
-          <a:gdLst/>
-          <a:ahLst/>
-          <a:cxnLst/>
-          <a:rect l="0" t="0" r="0" b="0"/>
-          <a:pathLst>
-            <a:path>
-              <a:moveTo>
-                <a:pt x="3085666" y="1463278"/>
-              </a:moveTo>
-              <a:arcTo wR="1543886" hR="1543886" stAng="21420430" swAng="2195114"/>
-            </a:path>
-          </a:pathLst>
-        </a:custGeom>
-        <a:noFill/>
-        <a:ln w="6350" cap="flat" cmpd="sng" algn="ctr">
-          <a:solidFill>
-            <a:schemeClr val="accent2">
-              <a:hueOff val="0"/>
-              <a:satOff val="0"/>
-              <a:lumOff val="0"/>
-              <a:alphaOff val="0"/>
-            </a:schemeClr>
-          </a:solidFill>
-          <a:prstDash val="solid"/>
-          <a:miter lim="800000"/>
-        </a:ln>
-        <a:effectLst/>
-      </dsp:spPr>
-      <dsp:style>
-        <a:lnRef idx="1">
-          <a:scrgbClr r="0" g="0" b="0"/>
-        </a:lnRef>
-        <a:fillRef idx="0">
-          <a:scrgbClr r="0" g="0" b="0"/>
-        </a:fillRef>
-        <a:effectRef idx="0">
-          <a:scrgbClr r="0" g="0" b="0"/>
-        </a:effectRef>
-        <a:fontRef idx="minor"/>
-      </dsp:style>
-    </dsp:sp>
-    <dsp:sp modelId="{314AD960-11B1-48FE-A6AB-562313CE59CB}">
-      <dsp:nvSpPr>
-        <dsp:cNvPr id="0" name=""/>
-        <dsp:cNvSpPr/>
-      </dsp:nvSpPr>
-      <dsp:spPr>
-        <a:xfrm>
-          <a:off x="3028702" y="2795028"/>
-          <a:ext cx="1189585" cy="773230"/>
-        </a:xfrm>
-        <a:prstGeom prst="roundRect">
-          <a:avLst/>
-        </a:prstGeom>
-        <a:solidFill>
-          <a:schemeClr val="lt1">
-            <a:hueOff val="0"/>
-            <a:satOff val="0"/>
-            <a:lumOff val="0"/>
-            <a:alphaOff val="0"/>
-          </a:schemeClr>
-        </a:solidFill>
-        <a:ln w="12700" cap="flat" cmpd="sng" algn="ctr">
-          <a:solidFill>
-            <a:schemeClr val="accent2">
-              <a:shade val="80000"/>
-              <a:hueOff val="0"/>
-              <a:satOff val="0"/>
-              <a:lumOff val="0"/>
-              <a:alphaOff val="0"/>
-            </a:schemeClr>
-          </a:solidFill>
-          <a:prstDash val="solid"/>
-          <a:miter lim="800000"/>
-        </a:ln>
-        <a:effectLst/>
-      </dsp:spPr>
-      <dsp:style>
-        <a:lnRef idx="2">
-          <a:scrgbClr r="0" g="0" b="0"/>
-        </a:lnRef>
-        <a:fillRef idx="1">
-          <a:scrgbClr r="0" g="0" b="0"/>
-        </a:fillRef>
-        <a:effectRef idx="0">
-          <a:scrgbClr r="0" g="0" b="0"/>
-        </a:effectRef>
-        <a:fontRef idx="minor">
-          <a:schemeClr val="lt1"/>
-        </a:fontRef>
-      </dsp:style>
-      <dsp:txBody>
-        <a:bodyPr spcFirstLastPara="0" vert="horz" wrap="square" lIns="83820" tIns="83820" rIns="83820" bIns="83820" numCol="1" spcCol="1270" anchor="ctr" anchorCtr="0">
-          <a:noAutofit/>
-        </a:bodyPr>
-        <a:lstStyle/>
-        <a:p>
-          <a:pPr lvl="0" algn="ctr" defTabSz="977900">
-            <a:lnSpc>
-              <a:spcPct val="90000"/>
-            </a:lnSpc>
-            <a:spcBef>
-              <a:spcPct val="0"/>
-            </a:spcBef>
-            <a:spcAft>
-              <a:spcPct val="35000"/>
-            </a:spcAft>
-          </a:pPr>
-          <a:r>
-            <a:rPr lang="en-US" sz="2200" kern="1200" dirty="0">
-              <a:solidFill>
-                <a:srgbClr val="D24726"/>
-              </a:solidFill>
-              <a:latin typeface="Segoe UI Light" panose="020B0502040204020203" pitchFamily="34" charset="0"/>
-              <a:ea typeface="+mj-ea"/>
-              <a:cs typeface="Segoe UI Light" panose="020B0502040204020203" pitchFamily="34" charset="0"/>
-            </a:rPr>
-            <a:t>Node 3</a:t>
-          </a:r>
-        </a:p>
-      </dsp:txBody>
-      <dsp:txXfrm>
-        <a:off x="3066448" y="2832774"/>
-        <a:ext cx="1114093" cy="697738"/>
-      </dsp:txXfrm>
-    </dsp:sp>
-    <dsp:sp modelId="{6EC830C9-72F5-44F0-A400-AFA36B6D2741}">
-      <dsp:nvSpPr>
-        <dsp:cNvPr id="0" name=""/>
-        <dsp:cNvSpPr/>
-      </dsp:nvSpPr>
-      <dsp:spPr>
-        <a:xfrm>
-          <a:off x="1172135" y="388727"/>
-          <a:ext cx="3087772" cy="3087772"/>
-        </a:xfrm>
-        <a:custGeom>
-          <a:avLst/>
-          <a:gdLst/>
-          <a:ahLst/>
-          <a:cxnLst/>
-          <a:rect l="0" t="0" r="0" b="0"/>
-          <a:pathLst>
-            <a:path>
-              <a:moveTo>
-                <a:pt x="1850440" y="3057031"/>
-              </a:moveTo>
-              <a:arcTo wR="1543886" hR="1543886" stAng="4712834" swAng="1374332"/>
-            </a:path>
-          </a:pathLst>
-        </a:custGeom>
-        <a:noFill/>
-        <a:ln w="6350" cap="flat" cmpd="sng" algn="ctr">
-          <a:solidFill>
-            <a:schemeClr val="accent2">
-              <a:hueOff val="0"/>
-              <a:satOff val="0"/>
-              <a:lumOff val="0"/>
-              <a:alphaOff val="0"/>
-            </a:schemeClr>
-          </a:solidFill>
-          <a:prstDash val="solid"/>
-          <a:miter lim="800000"/>
-        </a:ln>
-        <a:effectLst/>
-      </dsp:spPr>
-      <dsp:style>
-        <a:lnRef idx="1">
-          <a:scrgbClr r="0" g="0" b="0"/>
-        </a:lnRef>
-        <a:fillRef idx="0">
-          <a:scrgbClr r="0" g="0" b="0"/>
-        </a:fillRef>
-        <a:effectRef idx="0">
-          <a:scrgbClr r="0" g="0" b="0"/>
-        </a:effectRef>
-        <a:fontRef idx="minor"/>
-      </dsp:style>
-    </dsp:sp>
-    <dsp:sp modelId="{B945EB8D-AF78-4C31-B5AB-72C53D7CA97A}">
-      <dsp:nvSpPr>
-        <dsp:cNvPr id="0" name=""/>
-        <dsp:cNvSpPr/>
-      </dsp:nvSpPr>
-      <dsp:spPr>
-        <a:xfrm>
-          <a:off x="1213755" y="2795028"/>
-          <a:ext cx="1189585" cy="773230"/>
-        </a:xfrm>
-        <a:prstGeom prst="roundRect">
-          <a:avLst/>
-        </a:prstGeom>
-        <a:solidFill>
-          <a:schemeClr val="lt1">
-            <a:hueOff val="0"/>
-            <a:satOff val="0"/>
-            <a:lumOff val="0"/>
-            <a:alphaOff val="0"/>
-          </a:schemeClr>
-        </a:solidFill>
-        <a:ln w="12700" cap="flat" cmpd="sng" algn="ctr">
-          <a:solidFill>
-            <a:schemeClr val="accent2">
-              <a:shade val="80000"/>
-              <a:hueOff val="0"/>
-              <a:satOff val="0"/>
-              <a:lumOff val="0"/>
-              <a:alphaOff val="0"/>
-            </a:schemeClr>
-          </a:solidFill>
-          <a:prstDash val="solid"/>
-          <a:miter lim="800000"/>
-        </a:ln>
-        <a:effectLst/>
-      </dsp:spPr>
-      <dsp:style>
-        <a:lnRef idx="2">
-          <a:scrgbClr r="0" g="0" b="0"/>
-        </a:lnRef>
-        <a:fillRef idx="1">
-          <a:scrgbClr r="0" g="0" b="0"/>
-        </a:fillRef>
-        <a:effectRef idx="0">
-          <a:scrgbClr r="0" g="0" b="0"/>
-        </a:effectRef>
-        <a:fontRef idx="minor">
-          <a:schemeClr val="lt1"/>
-        </a:fontRef>
-      </dsp:style>
-      <dsp:txBody>
-        <a:bodyPr spcFirstLastPara="0" vert="horz" wrap="square" lIns="83820" tIns="83820" rIns="83820" bIns="83820" numCol="1" spcCol="1270" anchor="ctr" anchorCtr="0">
-          <a:noAutofit/>
-        </a:bodyPr>
-        <a:lstStyle/>
-        <a:p>
-          <a:pPr lvl="0" algn="ctr" defTabSz="977900">
-            <a:lnSpc>
-              <a:spcPct val="90000"/>
-            </a:lnSpc>
-            <a:spcBef>
-              <a:spcPct val="0"/>
-            </a:spcBef>
-            <a:spcAft>
-              <a:spcPct val="35000"/>
-            </a:spcAft>
-          </a:pPr>
-          <a:r>
-            <a:rPr lang="en-US" sz="2200" kern="1200" dirty="0">
-              <a:solidFill>
-                <a:srgbClr val="D24726"/>
-              </a:solidFill>
-              <a:latin typeface="Segoe UI Light" panose="020B0502040204020203" pitchFamily="34" charset="0"/>
-              <a:ea typeface="+mj-ea"/>
-              <a:cs typeface="Segoe UI Light" panose="020B0502040204020203" pitchFamily="34" charset="0"/>
-            </a:rPr>
-            <a:t>Node 4</a:t>
-          </a:r>
-        </a:p>
-      </dsp:txBody>
-      <dsp:txXfrm>
-        <a:off x="1251501" y="2832774"/>
-        <a:ext cx="1114093" cy="697738"/>
-      </dsp:txXfrm>
-    </dsp:sp>
-    <dsp:sp modelId="{6C263C1A-7610-4CC9-AEFA-71FBD03C0367}">
-      <dsp:nvSpPr>
-        <dsp:cNvPr id="0" name=""/>
-        <dsp:cNvSpPr/>
-      </dsp:nvSpPr>
-      <dsp:spPr>
-        <a:xfrm>
-          <a:off x="1172135" y="388727"/>
-          <a:ext cx="3087772" cy="3087772"/>
-        </a:xfrm>
-        <a:custGeom>
-          <a:avLst/>
-          <a:gdLst/>
-          <a:ahLst/>
-          <a:cxnLst/>
-          <a:rect l="0" t="0" r="0" b="0"/>
-          <a:pathLst>
-            <a:path>
-              <a:moveTo>
-                <a:pt x="257837" y="2398089"/>
-              </a:moveTo>
-              <a:arcTo wR="1543886" hR="1543886" stAng="8784456" swAng="2195114"/>
-            </a:path>
-          </a:pathLst>
-        </a:custGeom>
-        <a:noFill/>
-        <a:ln w="6350" cap="flat" cmpd="sng" algn="ctr">
-          <a:solidFill>
-            <a:schemeClr val="accent2">
-              <a:hueOff val="0"/>
-              <a:satOff val="0"/>
-              <a:lumOff val="0"/>
-              <a:alphaOff val="0"/>
-            </a:schemeClr>
-          </a:solidFill>
-          <a:prstDash val="solid"/>
-          <a:miter lim="800000"/>
-        </a:ln>
-        <a:effectLst/>
-      </dsp:spPr>
-      <dsp:style>
-        <a:lnRef idx="1">
-          <a:scrgbClr r="0" g="0" b="0"/>
-        </a:lnRef>
-        <a:fillRef idx="0">
-          <a:scrgbClr r="0" g="0" b="0"/>
-        </a:fillRef>
-        <a:effectRef idx="0">
-          <a:scrgbClr r="0" g="0" b="0"/>
-        </a:effectRef>
-        <a:fontRef idx="minor"/>
-      </dsp:style>
-    </dsp:sp>
-    <dsp:sp modelId="{A834C8E2-2D17-44CE-8777-F41D710F9561}">
-      <dsp:nvSpPr>
-        <dsp:cNvPr id="0" name=""/>
-        <dsp:cNvSpPr/>
-      </dsp:nvSpPr>
-      <dsp:spPr>
-        <a:xfrm>
-          <a:off x="652906" y="1068911"/>
-          <a:ext cx="1189585" cy="773230"/>
-        </a:xfrm>
-        <a:prstGeom prst="roundRect">
-          <a:avLst/>
-        </a:prstGeom>
-        <a:solidFill>
-          <a:schemeClr val="lt1">
-            <a:hueOff val="0"/>
-            <a:satOff val="0"/>
-            <a:lumOff val="0"/>
-            <a:alphaOff val="0"/>
-          </a:schemeClr>
-        </a:solidFill>
-        <a:ln w="12700" cap="flat" cmpd="sng" algn="ctr">
-          <a:solidFill>
-            <a:schemeClr val="accent2">
-              <a:shade val="80000"/>
-              <a:hueOff val="0"/>
-              <a:satOff val="0"/>
-              <a:lumOff val="0"/>
-              <a:alphaOff val="0"/>
-            </a:schemeClr>
-          </a:solidFill>
-          <a:prstDash val="solid"/>
-          <a:miter lim="800000"/>
-        </a:ln>
-        <a:effectLst/>
-      </dsp:spPr>
-      <dsp:style>
-        <a:lnRef idx="2">
-          <a:scrgbClr r="0" g="0" b="0"/>
-        </a:lnRef>
-        <a:fillRef idx="1">
-          <a:scrgbClr r="0" g="0" b="0"/>
-        </a:fillRef>
-        <a:effectRef idx="0">
-          <a:scrgbClr r="0" g="0" b="0"/>
-        </a:effectRef>
-        <a:fontRef idx="minor">
-          <a:schemeClr val="lt1"/>
-        </a:fontRef>
-      </dsp:style>
-      <dsp:txBody>
-        <a:bodyPr spcFirstLastPara="0" vert="horz" wrap="square" lIns="83820" tIns="83820" rIns="83820" bIns="83820" numCol="1" spcCol="1270" anchor="ctr" anchorCtr="0">
-          <a:noAutofit/>
-        </a:bodyPr>
-        <a:lstStyle/>
-        <a:p>
-          <a:pPr lvl="0" algn="ctr" defTabSz="977900">
-            <a:lnSpc>
-              <a:spcPct val="90000"/>
-            </a:lnSpc>
-            <a:spcBef>
-              <a:spcPct val="0"/>
-            </a:spcBef>
-            <a:spcAft>
-              <a:spcPct val="35000"/>
-            </a:spcAft>
-          </a:pPr>
-          <a:r>
-            <a:rPr lang="en-US" sz="2200" kern="1200" dirty="0">
-              <a:solidFill>
-                <a:srgbClr val="D24726"/>
-              </a:solidFill>
-              <a:latin typeface="Segoe UI Light" panose="020B0502040204020203" pitchFamily="34" charset="0"/>
-              <a:ea typeface="+mj-ea"/>
-              <a:cs typeface="Segoe UI Light" panose="020B0502040204020203" pitchFamily="34" charset="0"/>
-            </a:rPr>
-            <a:t>Node</a:t>
-          </a:r>
-          <a:r>
-            <a:rPr lang="en-US" sz="2200" kern="1200" dirty="0">
-              <a:solidFill>
-                <a:srgbClr val="D24726"/>
-              </a:solidFill>
-            </a:rPr>
-            <a:t> </a:t>
-          </a:r>
-          <a:r>
-            <a:rPr lang="en-US" sz="2200" kern="1200" dirty="0">
-              <a:solidFill>
-                <a:srgbClr val="D24726"/>
-              </a:solidFill>
-              <a:latin typeface="Segoe UI Light" panose="020B0502040204020203" pitchFamily="34" charset="0"/>
-              <a:ea typeface="+mj-ea"/>
-              <a:cs typeface="Segoe UI Light" panose="020B0502040204020203" pitchFamily="34" charset="0"/>
-            </a:rPr>
-            <a:t>5</a:t>
-          </a:r>
-        </a:p>
-      </dsp:txBody>
-      <dsp:txXfrm>
-        <a:off x="690652" y="1106657"/>
-        <a:ext cx="1114093" cy="697738"/>
-      </dsp:txXfrm>
-    </dsp:sp>
-    <dsp:sp modelId="{226AE663-04B8-4614-9ED7-20BDF7F4D263}">
-      <dsp:nvSpPr>
-        <dsp:cNvPr id="0" name=""/>
-        <dsp:cNvSpPr/>
-      </dsp:nvSpPr>
-      <dsp:spPr>
-        <a:xfrm>
-          <a:off x="1172135" y="388727"/>
-          <a:ext cx="3087772" cy="3087772"/>
-        </a:xfrm>
-        <a:custGeom>
-          <a:avLst/>
-          <a:gdLst/>
-          <a:ahLst/>
-          <a:cxnLst/>
-          <a:rect l="0" t="0" r="0" b="0"/>
-          <a:pathLst>
-            <a:path>
-              <a:moveTo>
-                <a:pt x="269171" y="672859"/>
-              </a:moveTo>
-              <a:arcTo wR="1543886" hR="1543886" stAng="12860714" swAng="1959991"/>
-            </a:path>
-          </a:pathLst>
-        </a:custGeom>
-        <a:noFill/>
-        <a:ln w="6350" cap="flat" cmpd="sng" algn="ctr">
-          <a:solidFill>
-            <a:schemeClr val="accent2">
-              <a:hueOff val="0"/>
-              <a:satOff val="0"/>
-              <a:lumOff val="0"/>
-              <a:alphaOff val="0"/>
-            </a:schemeClr>
-          </a:solidFill>
-          <a:prstDash val="solid"/>
-          <a:miter lim="800000"/>
-        </a:ln>
-        <a:effectLst/>
-      </dsp:spPr>
-      <dsp:style>
-        <a:lnRef idx="1">
-          <a:scrgbClr r="0" g="0" b="0"/>
-        </a:lnRef>
-        <a:fillRef idx="0">
-          <a:scrgbClr r="0" g="0" b="0"/>
-        </a:fillRef>
-        <a:effectRef idx="0">
-          <a:scrgbClr r="0" g="0" b="0"/>
-        </a:effectRef>
-        <a:fontRef idx="minor"/>
-      </dsp:style>
-    </dsp:sp>
   </dsp:spTree>
 </dsp:drawing>
 </file>
@@ -3367,421 +2696,6 @@
       <dsp:cNvGrpSpPr/>
     </dsp:nvGrpSpPr>
     <dsp:grpSpPr/>
-    <dsp:sp modelId="{DB5BCEB9-0713-465D-BAE4-41008A09F44D}">
-      <dsp:nvSpPr>
-        <dsp:cNvPr id="0" name=""/>
-        <dsp:cNvSpPr/>
-      </dsp:nvSpPr>
-      <dsp:spPr>
-        <a:xfrm>
-          <a:off x="1554729" y="1642795"/>
-          <a:ext cx="1287477" cy="1287477"/>
-        </a:xfrm>
-        <a:prstGeom prst="ellipse">
-          <a:avLst/>
-        </a:prstGeom>
-        <a:solidFill>
-          <a:srgbClr val="D24726"/>
-        </a:solidFill>
-        <a:ln w="12700" cap="flat" cmpd="sng" algn="ctr">
-          <a:solidFill>
-            <a:schemeClr val="lt1">
-              <a:hueOff val="0"/>
-              <a:satOff val="0"/>
-              <a:lumOff val="0"/>
-              <a:alphaOff val="0"/>
-            </a:schemeClr>
-          </a:solidFill>
-          <a:prstDash val="solid"/>
-          <a:miter lim="800000"/>
-        </a:ln>
-        <a:effectLst/>
-      </dsp:spPr>
-      <dsp:style>
-        <a:lnRef idx="2">
-          <a:scrgbClr r="0" g="0" b="0"/>
-        </a:lnRef>
-        <a:fillRef idx="1">
-          <a:scrgbClr r="0" g="0" b="0"/>
-        </a:fillRef>
-        <a:effectRef idx="0">
-          <a:scrgbClr r="0" g="0" b="0"/>
-        </a:effectRef>
-        <a:fontRef idx="minor">
-          <a:schemeClr val="lt1"/>
-        </a:fontRef>
-      </dsp:style>
-      <dsp:txBody>
-        <a:bodyPr spcFirstLastPara="0" vert="horz" wrap="square" lIns="12700" tIns="12700" rIns="12700" bIns="12700" numCol="1" spcCol="1270" anchor="ctr" anchorCtr="0">
-          <a:noAutofit/>
-        </a:bodyPr>
-        <a:lstStyle/>
-        <a:p>
-          <a:pPr lvl="0" algn="ctr" defTabSz="889000">
-            <a:lnSpc>
-              <a:spcPct val="90000"/>
-            </a:lnSpc>
-            <a:spcBef>
-              <a:spcPct val="0"/>
-            </a:spcBef>
-            <a:spcAft>
-              <a:spcPct val="35000"/>
-            </a:spcAft>
-          </a:pPr>
-          <a:r>
-            <a:rPr lang="en-US" sz="2000" kern="1200" dirty="0" smtClean="0"/>
-            <a:t>Domain</a:t>
-          </a:r>
-          <a:endParaRPr lang="en-US" sz="2000" kern="1200" dirty="0"/>
-        </a:p>
-      </dsp:txBody>
-      <dsp:txXfrm>
-        <a:off x="1743276" y="1831342"/>
-        <a:ext cx="910383" cy="910383"/>
-      </dsp:txXfrm>
-    </dsp:sp>
-    <dsp:sp modelId="{74468A4D-70A3-4880-8935-DDF3701E1C20}">
-      <dsp:nvSpPr>
-        <dsp:cNvPr id="0" name=""/>
-        <dsp:cNvSpPr/>
-      </dsp:nvSpPr>
-      <dsp:spPr>
-        <a:xfrm rot="12900000">
-          <a:off x="628561" y="1385122"/>
-          <a:ext cx="1089146" cy="366931"/>
-        </a:xfrm>
-        <a:prstGeom prst="leftArrow">
-          <a:avLst>
-            <a:gd name="adj1" fmla="val 60000"/>
-            <a:gd name="adj2" fmla="val 50000"/>
-          </a:avLst>
-        </a:prstGeom>
-        <a:solidFill>
-          <a:srgbClr val="F8CFB6"/>
-        </a:solidFill>
-        <a:ln>
-          <a:noFill/>
-        </a:ln>
-        <a:effectLst/>
-      </dsp:spPr>
-      <dsp:style>
-        <a:lnRef idx="0">
-          <a:scrgbClr r="0" g="0" b="0"/>
-        </a:lnRef>
-        <a:fillRef idx="1">
-          <a:scrgbClr r="0" g="0" b="0"/>
-        </a:fillRef>
-        <a:effectRef idx="0">
-          <a:scrgbClr r="0" g="0" b="0"/>
-        </a:effectRef>
-        <a:fontRef idx="minor">
-          <a:schemeClr val="lt1"/>
-        </a:fontRef>
-      </dsp:style>
-    </dsp:sp>
-    <dsp:sp modelId="{A91EC127-07CB-47FA-8B45-C656741EF170}">
-      <dsp:nvSpPr>
-        <dsp:cNvPr id="0" name=""/>
-        <dsp:cNvSpPr/>
-      </dsp:nvSpPr>
-      <dsp:spPr>
-        <a:xfrm>
-          <a:off x="115494" y="766991"/>
-          <a:ext cx="1223103" cy="978483"/>
-        </a:xfrm>
-        <a:prstGeom prst="roundRect">
-          <a:avLst>
-            <a:gd name="adj" fmla="val 10000"/>
-          </a:avLst>
-        </a:prstGeom>
-        <a:solidFill>
-          <a:srgbClr val="D24726"/>
-        </a:solidFill>
-        <a:ln w="12700" cap="flat" cmpd="sng" algn="ctr">
-          <a:solidFill>
-            <a:schemeClr val="lt1">
-              <a:hueOff val="0"/>
-              <a:satOff val="0"/>
-              <a:lumOff val="0"/>
-              <a:alphaOff val="0"/>
-            </a:schemeClr>
-          </a:solidFill>
-          <a:prstDash val="solid"/>
-          <a:miter lim="800000"/>
-        </a:ln>
-        <a:effectLst/>
-      </dsp:spPr>
-      <dsp:style>
-        <a:lnRef idx="2">
-          <a:scrgbClr r="0" g="0" b="0"/>
-        </a:lnRef>
-        <a:fillRef idx="1">
-          <a:scrgbClr r="0" g="0" b="0"/>
-        </a:fillRef>
-        <a:effectRef idx="0">
-          <a:scrgbClr r="0" g="0" b="0"/>
-        </a:effectRef>
-        <a:fontRef idx="minor">
-          <a:schemeClr val="lt1"/>
-        </a:fontRef>
-      </dsp:style>
-      <dsp:txBody>
-        <a:bodyPr spcFirstLastPara="0" vert="horz" wrap="square" lIns="26670" tIns="26670" rIns="26670" bIns="26670" numCol="1" spcCol="1270" anchor="ctr" anchorCtr="0">
-          <a:noAutofit/>
-        </a:bodyPr>
-        <a:lstStyle/>
-        <a:p>
-          <a:pPr lvl="0" algn="ctr" defTabSz="622300">
-            <a:lnSpc>
-              <a:spcPct val="90000"/>
-            </a:lnSpc>
-            <a:spcBef>
-              <a:spcPct val="0"/>
-            </a:spcBef>
-            <a:spcAft>
-              <a:spcPct val="35000"/>
-            </a:spcAft>
-          </a:pPr>
-          <a:r>
-            <a:rPr lang="en-US" sz="1400" kern="1200" dirty="0" smtClean="0"/>
-            <a:t>Bounded Context</a:t>
-          </a:r>
-          <a:endParaRPr lang="en-US" sz="1400" kern="1200" dirty="0"/>
-        </a:p>
-      </dsp:txBody>
-      <dsp:txXfrm>
-        <a:off x="144153" y="795650"/>
-        <a:ext cx="1165785" cy="921165"/>
-      </dsp:txXfrm>
-    </dsp:sp>
-    <dsp:sp modelId="{96B9E08B-0BF3-4FBC-87CD-104C4419927A}">
-      <dsp:nvSpPr>
-        <dsp:cNvPr id="0" name=""/>
-        <dsp:cNvSpPr/>
-      </dsp:nvSpPr>
-      <dsp:spPr>
-        <a:xfrm rot="16200000">
-          <a:off x="1653894" y="851367"/>
-          <a:ext cx="1089146" cy="366931"/>
-        </a:xfrm>
-        <a:prstGeom prst="leftArrow">
-          <a:avLst>
-            <a:gd name="adj1" fmla="val 60000"/>
-            <a:gd name="adj2" fmla="val 50000"/>
-          </a:avLst>
-        </a:prstGeom>
-        <a:solidFill>
-          <a:srgbClr val="F8CFB6"/>
-        </a:solidFill>
-        <a:ln>
-          <a:noFill/>
-        </a:ln>
-        <a:effectLst/>
-      </dsp:spPr>
-      <dsp:style>
-        <a:lnRef idx="0">
-          <a:scrgbClr r="0" g="0" b="0"/>
-        </a:lnRef>
-        <a:fillRef idx="1">
-          <a:scrgbClr r="0" g="0" b="0"/>
-        </a:fillRef>
-        <a:effectRef idx="0">
-          <a:scrgbClr r="0" g="0" b="0"/>
-        </a:effectRef>
-        <a:fontRef idx="minor">
-          <a:schemeClr val="lt1"/>
-        </a:fontRef>
-      </dsp:style>
-    </dsp:sp>
-    <dsp:sp modelId="{BBDE044E-1FE9-413D-B3EF-4E1EF2039827}">
-      <dsp:nvSpPr>
-        <dsp:cNvPr id="0" name=""/>
-        <dsp:cNvSpPr/>
-      </dsp:nvSpPr>
-      <dsp:spPr>
-        <a:xfrm>
-          <a:off x="1586916" y="1018"/>
-          <a:ext cx="1223103" cy="978483"/>
-        </a:xfrm>
-        <a:prstGeom prst="roundRect">
-          <a:avLst>
-            <a:gd name="adj" fmla="val 10000"/>
-          </a:avLst>
-        </a:prstGeom>
-        <a:solidFill>
-          <a:srgbClr val="D24726"/>
-        </a:solidFill>
-        <a:ln w="12700" cap="flat" cmpd="sng" algn="ctr">
-          <a:solidFill>
-            <a:schemeClr val="lt1">
-              <a:hueOff val="0"/>
-              <a:satOff val="0"/>
-              <a:lumOff val="0"/>
-              <a:alphaOff val="0"/>
-            </a:schemeClr>
-          </a:solidFill>
-          <a:prstDash val="solid"/>
-          <a:miter lim="800000"/>
-        </a:ln>
-        <a:effectLst/>
-      </dsp:spPr>
-      <dsp:style>
-        <a:lnRef idx="2">
-          <a:scrgbClr r="0" g="0" b="0"/>
-        </a:lnRef>
-        <a:fillRef idx="1">
-          <a:scrgbClr r="0" g="0" b="0"/>
-        </a:fillRef>
-        <a:effectRef idx="0">
-          <a:scrgbClr r="0" g="0" b="0"/>
-        </a:effectRef>
-        <a:fontRef idx="minor">
-          <a:schemeClr val="lt1"/>
-        </a:fontRef>
-      </dsp:style>
-      <dsp:txBody>
-        <a:bodyPr spcFirstLastPara="0" vert="horz" wrap="square" lIns="26670" tIns="26670" rIns="26670" bIns="26670" numCol="1" spcCol="1270" anchor="ctr" anchorCtr="0">
-          <a:noAutofit/>
-        </a:bodyPr>
-        <a:lstStyle/>
-        <a:p>
-          <a:pPr lvl="0" algn="ctr" defTabSz="622300">
-            <a:lnSpc>
-              <a:spcPct val="90000"/>
-            </a:lnSpc>
-            <a:spcBef>
-              <a:spcPct val="0"/>
-            </a:spcBef>
-            <a:spcAft>
-              <a:spcPct val="35000"/>
-            </a:spcAft>
-          </a:pPr>
-          <a:r>
-            <a:rPr lang="en-US" sz="1400" kern="1200" dirty="0" smtClean="0"/>
-            <a:t>Single Responsibility Principal</a:t>
-          </a:r>
-          <a:endParaRPr lang="en-US" sz="1400" kern="1200" dirty="0"/>
-        </a:p>
-      </dsp:txBody>
-      <dsp:txXfrm>
-        <a:off x="1615575" y="29677"/>
-        <a:ext cx="1165785" cy="921165"/>
-      </dsp:txXfrm>
-    </dsp:sp>
-    <dsp:sp modelId="{295CEE7A-D8F7-4B65-9C84-E38052FE6573}">
-      <dsp:nvSpPr>
-        <dsp:cNvPr id="0" name=""/>
-        <dsp:cNvSpPr/>
-      </dsp:nvSpPr>
-      <dsp:spPr>
-        <a:xfrm rot="19500000">
-          <a:off x="2679228" y="1385122"/>
-          <a:ext cx="1089146" cy="366931"/>
-        </a:xfrm>
-        <a:prstGeom prst="leftArrow">
-          <a:avLst>
-            <a:gd name="adj1" fmla="val 60000"/>
-            <a:gd name="adj2" fmla="val 50000"/>
-          </a:avLst>
-        </a:prstGeom>
-        <a:solidFill>
-          <a:srgbClr val="F8CFB6"/>
-        </a:solidFill>
-        <a:ln>
-          <a:noFill/>
-        </a:ln>
-        <a:effectLst/>
-      </dsp:spPr>
-      <dsp:style>
-        <a:lnRef idx="0">
-          <a:scrgbClr r="0" g="0" b="0"/>
-        </a:lnRef>
-        <a:fillRef idx="1">
-          <a:scrgbClr r="0" g="0" b="0"/>
-        </a:fillRef>
-        <a:effectRef idx="0">
-          <a:scrgbClr r="0" g="0" b="0"/>
-        </a:effectRef>
-        <a:fontRef idx="minor">
-          <a:schemeClr val="lt1"/>
-        </a:fontRef>
-      </dsp:style>
-    </dsp:sp>
-    <dsp:sp modelId="{E2B774FB-C9C7-4233-A2B1-0D676A448C3A}">
-      <dsp:nvSpPr>
-        <dsp:cNvPr id="0" name=""/>
-        <dsp:cNvSpPr/>
-      </dsp:nvSpPr>
-      <dsp:spPr>
-        <a:xfrm>
-          <a:off x="3058337" y="766991"/>
-          <a:ext cx="1223103" cy="978483"/>
-        </a:xfrm>
-        <a:prstGeom prst="roundRect">
-          <a:avLst>
-            <a:gd name="adj" fmla="val 10000"/>
-          </a:avLst>
-        </a:prstGeom>
-        <a:solidFill>
-          <a:srgbClr val="D24726"/>
-        </a:solidFill>
-        <a:ln w="12700" cap="flat" cmpd="sng" algn="ctr">
-          <a:solidFill>
-            <a:schemeClr val="lt1">
-              <a:hueOff val="0"/>
-              <a:satOff val="0"/>
-              <a:lumOff val="0"/>
-              <a:alphaOff val="0"/>
-            </a:schemeClr>
-          </a:solidFill>
-          <a:prstDash val="solid"/>
-          <a:miter lim="800000"/>
-        </a:ln>
-        <a:effectLst/>
-      </dsp:spPr>
-      <dsp:style>
-        <a:lnRef idx="2">
-          <a:scrgbClr r="0" g="0" b="0"/>
-        </a:lnRef>
-        <a:fillRef idx="1">
-          <a:scrgbClr r="0" g="0" b="0"/>
-        </a:fillRef>
-        <a:effectRef idx="0">
-          <a:scrgbClr r="0" g="0" b="0"/>
-        </a:effectRef>
-        <a:fontRef idx="minor">
-          <a:schemeClr val="lt1"/>
-        </a:fontRef>
-      </dsp:style>
-      <dsp:txBody>
-        <a:bodyPr spcFirstLastPara="0" vert="horz" wrap="square" lIns="26670" tIns="26670" rIns="26670" bIns="26670" numCol="1" spcCol="1270" anchor="ctr" anchorCtr="0">
-          <a:noAutofit/>
-        </a:bodyPr>
-        <a:lstStyle/>
-        <a:p>
-          <a:pPr lvl="0" algn="ctr" defTabSz="622300">
-            <a:lnSpc>
-              <a:spcPct val="90000"/>
-            </a:lnSpc>
-            <a:spcBef>
-              <a:spcPct val="0"/>
-            </a:spcBef>
-            <a:spcAft>
-              <a:spcPct val="35000"/>
-            </a:spcAft>
-          </a:pPr>
-          <a:r>
-            <a:rPr lang="en-US" sz="1400" kern="1200" dirty="0" smtClean="0"/>
-            <a:t>Ubiquitous Language</a:t>
-          </a:r>
-          <a:endParaRPr lang="en-US" sz="1400" kern="1200" dirty="0"/>
-        </a:p>
-      </dsp:txBody>
-      <dsp:txXfrm>
-        <a:off x="3086996" y="795650"/>
-        <a:ext cx="1165785" cy="921165"/>
-      </dsp:txXfrm>
-    </dsp:sp>
   </dsp:spTree>
 </dsp:drawing>
 </file>
@@ -6405,7 +5319,7 @@
           <a:p>
             <a:fld id="{80680FBE-A8DF-4758-9AC4-3A9E1039168F}" type="datetimeFigureOut">
               <a:rPr lang="en-US" smtClean="0"/>
-              <a:t>12/1/2016</a:t>
+              <a:t>12/2/2016</a:t>
             </a:fld>
             <a:endParaRPr lang="en-US"/>
           </a:p>
@@ -6570,7 +5484,7 @@
           <a:p>
             <a:fld id="{EC13577B-6902-467D-A26C-08A0DD5E4E03}" type="datetimeFigureOut">
               <a:rPr lang="en-US" smtClean="0"/>
-              <a:t>12/1/2016</a:t>
+              <a:t>12/2/2016</a:t>
             </a:fld>
             <a:endParaRPr lang="en-US"/>
           </a:p>
@@ -6940,11 +5854,7 @@
             </a:r>
             <a:r>
               <a:rPr lang="en-US" baseline="0" dirty="0" smtClean="0"/>
-              <a:t>. </a:t>
-            </a:r>
-            <a:r>
-              <a:rPr lang="en-US" baseline="0" dirty="0" smtClean="0"/>
-              <a:t>We are not experts in microservices but a set of techies who love to learn new technologies.</a:t>
+              <a:t>. We are not experts in microservices but a set of techies who love to learn new technologies.</a:t>
             </a:r>
           </a:p>
           <a:p>
@@ -6954,31 +5864,7 @@
             </a:pPr>
             <a:r>
               <a:rPr lang="en-US" baseline="0" dirty="0" smtClean="0"/>
-              <a:t>This </a:t>
-            </a:r>
-            <a:r>
-              <a:rPr lang="en-US" baseline="0" dirty="0" smtClean="0"/>
-              <a:t>K-talk is about </a:t>
-            </a:r>
-            <a:r>
-              <a:rPr lang="en-US" baseline="0" dirty="0" smtClean="0"/>
-              <a:t>Microservice, </a:t>
-            </a:r>
-            <a:r>
-              <a:rPr lang="en-US" baseline="0" dirty="0" smtClean="0"/>
-              <a:t>we will be </a:t>
-            </a:r>
-            <a:r>
-              <a:rPr lang="en-US" baseline="0" dirty="0" smtClean="0"/>
-              <a:t>touching base with </a:t>
-            </a:r>
-            <a:r>
-              <a:rPr lang="en-US" baseline="0" dirty="0" smtClean="0"/>
-              <a:t>Azure Service </a:t>
-            </a:r>
-            <a:r>
-              <a:rPr lang="en-US" baseline="0" dirty="0" smtClean="0"/>
-              <a:t>Fabric. </a:t>
+              <a:t>This K-talk is about Microservice, we will be touching base with Azure Service Fabric. </a:t>
             </a:r>
             <a:endParaRPr lang="en-US" dirty="0"/>
           </a:p>
@@ -7094,11 +5980,7 @@
             </a:pPr>
             <a:r>
               <a:rPr lang="en-US" baseline="0" dirty="0" smtClean="0"/>
-              <a:t>It’s </a:t>
-            </a:r>
-            <a:r>
-              <a:rPr lang="en-US" baseline="0" dirty="0" smtClean="0"/>
-              <a:t>a simple state machine.</a:t>
+              <a:t>It’s a simple state machine.</a:t>
             </a:r>
           </a:p>
           <a:p>
@@ -8127,11 +7009,7 @@
             </a:pPr>
             <a:r>
               <a:rPr lang="en-US" dirty="0" smtClean="0"/>
-              <a:t>The </a:t>
-            </a:r>
-            <a:r>
-              <a:rPr lang="en-US" dirty="0" smtClean="0"/>
-              <a:t>service registry</a:t>
+              <a:t>The service registry</a:t>
             </a:r>
             <a:r>
               <a:rPr lang="en-US" baseline="0" dirty="0" smtClean="0"/>
@@ -8267,23 +7145,11 @@
             </a:pPr>
             <a:r>
               <a:rPr lang="en-US" dirty="0" smtClean="0"/>
-              <a:t>The </a:t>
-            </a:r>
-            <a:r>
-              <a:rPr lang="en-US" dirty="0" smtClean="0"/>
-              <a:t>service</a:t>
+              <a:t>The service</a:t>
             </a:r>
             <a:r>
               <a:rPr lang="en-US" baseline="0" dirty="0" smtClean="0"/>
-              <a:t> register communication is handed over to a router or load balancer. This router talks to the service </a:t>
-            </a:r>
-            <a:r>
-              <a:rPr lang="en-US" baseline="0" dirty="0" smtClean="0"/>
-              <a:t>register </a:t>
-            </a:r>
-            <a:r>
-              <a:rPr lang="en-US" baseline="0" dirty="0" smtClean="0"/>
-              <a:t>to locate the service.</a:t>
+              <a:t> register communication is handed over to a router or load balancer. This router talks to the service register to locate the service.</a:t>
             </a:r>
           </a:p>
           <a:p>
@@ -10760,15 +9626,7 @@
             </a:r>
             <a:r>
               <a:rPr lang="en-US" baseline="0" dirty="0" smtClean="0"/>
-              <a:t> is a quite a debate between the SOA community and microservices community about </a:t>
-            </a:r>
-            <a:r>
-              <a:rPr lang="en-US" baseline="0" dirty="0" smtClean="0"/>
-              <a:t>this. SOA </a:t>
-            </a:r>
-            <a:r>
-              <a:rPr lang="en-US" baseline="0" dirty="0" smtClean="0"/>
-              <a:t>community claims that they have been following the </a:t>
+              <a:t> is a quite a debate between the SOA community and microservices community about this. SOA community claims that they have been following the </a:t>
             </a:r>
             <a:r>
               <a:rPr lang="en-US" baseline="0" dirty="0" err="1" smtClean="0"/>
@@ -10786,19 +9644,7 @@
             </a:pPr>
             <a:r>
               <a:rPr lang="en-US" baseline="0" dirty="0" smtClean="0"/>
-              <a:t>Martin </a:t>
-            </a:r>
-            <a:r>
-              <a:rPr lang="en-US" baseline="0" dirty="0" smtClean="0"/>
-              <a:t>Flower a famous microservices solution architect states </a:t>
-            </a:r>
-            <a:r>
-              <a:rPr lang="en-US" baseline="0" dirty="0" smtClean="0"/>
-              <a:t>that Microservices are a subset of </a:t>
-            </a:r>
-            <a:r>
-              <a:rPr lang="en-US" baseline="0" dirty="0" smtClean="0"/>
-              <a:t>SOA</a:t>
+              <a:t>Martin Flower a famous microservices solution architect states that Microservices are a subset of SOA</a:t>
             </a:r>
           </a:p>
           <a:p>
@@ -10854,11 +9700,7 @@
             </a:pPr>
             <a:r>
               <a:rPr lang="en-US" baseline="0" dirty="0" smtClean="0"/>
-              <a:t>Service </a:t>
-            </a:r>
-            <a:r>
-              <a:rPr lang="en-US" baseline="0" dirty="0" smtClean="0"/>
-              <a:t>modeling happens around business capabilities</a:t>
+              <a:t>Service modeling happens around business capabilities</a:t>
             </a:r>
           </a:p>
           <a:p>
@@ -11499,7 +10341,7 @@
           <a:p>
             <a:fld id="{8BEEBAAA-29B5-4AF5-BC5F-7E580C29002D}" type="datetimeFigureOut">
               <a:rPr lang="en-US" smtClean="0"/>
-              <a:t>12/1/2016</a:t>
+              <a:t>12/2/2016</a:t>
             </a:fld>
             <a:endParaRPr lang="en-US"/>
           </a:p>
@@ -12281,7 +11123,7 @@
           <a:p>
             <a:fld id="{8BEEBAAA-29B5-4AF5-BC5F-7E580C29002D}" type="datetimeFigureOut">
               <a:rPr lang="en-US" smtClean="0"/>
-              <a:t>12/1/2016</a:t>
+              <a:t>12/2/2016</a:t>
             </a:fld>
             <a:endParaRPr lang="en-US"/>
           </a:p>
@@ -12793,7 +11635,7 @@
           <a:p>
             <a:fld id="{8BEEBAAA-29B5-4AF5-BC5F-7E580C29002D}" type="datetimeFigureOut">
               <a:rPr lang="en-US" smtClean="0"/>
-              <a:t>12/1/2016</a:t>
+              <a:t>12/2/2016</a:t>
             </a:fld>
             <a:endParaRPr lang="en-US"/>
           </a:p>
@@ -13239,12 +12081,12 @@
         <p:spPr>
           <a:xfrm>
             <a:off x="855620" y="2933105"/>
-            <a:ext cx="9582736" cy="1137793"/>
+            <a:ext cx="10936330" cy="1137793"/>
           </a:xfrm>
         </p:spPr>
         <p:txBody>
           <a:bodyPr>
-            <a:normAutofit/>
+            <a:normAutofit fontScale="92500"/>
           </a:bodyPr>
           <a:lstStyle/>
           <a:p>
@@ -13252,13 +12094,36 @@
               <a:buNone/>
             </a:pPr>
             <a:r>
-              <a:rPr lang="en-US" sz="2400" dirty="0" smtClean="0">
+              <a:rPr lang="en-US" sz="3000" dirty="0" smtClean="0">
                 <a:solidFill>
                   <a:schemeClr val="bg1"/>
                 </a:solidFill>
                 <a:latin typeface="+mj-lt"/>
               </a:rPr>
-              <a:t>Resilient and Reliable Service Implementation Using Azure Service Fabric</a:t>
+              <a:t>Resilient and Reliable Service Implementation Using Azure Service </a:t>
+            </a:r>
+            <a:r>
+              <a:rPr lang="en-US" sz="3000" dirty="0" smtClean="0">
+                <a:solidFill>
+                  <a:schemeClr val="bg1"/>
+                </a:solidFill>
+                <a:latin typeface="+mj-lt"/>
+              </a:rPr>
+              <a:t>Fabric</a:t>
+            </a:r>
+          </a:p>
+          <a:p>
+            <a:pPr marL="0" indent="0">
+              <a:buNone/>
+            </a:pPr>
+            <a:r>
+              <a:rPr lang="en-US" sz="2400" dirty="0" smtClean="0">
+                <a:solidFill>
+                  <a:schemeClr val="bg1"/>
+                </a:solidFill>
+                <a:latin typeface="+mj-lt"/>
+              </a:rPr>
+              <a:t>By Brian Perera and the Micros Team</a:t>
             </a:r>
             <a:endParaRPr lang="en-US" sz="2400" dirty="0">
               <a:solidFill>
@@ -25792,14 +24657,7 @@
                 <a:latin typeface="Segoe UI Light" panose="020B0502040204020203" pitchFamily="34" charset="0"/>
                 <a:cs typeface="Segoe UI Light" panose="020B0502040204020203" pitchFamily="34" charset="0"/>
               </a:rPr>
-              <a:t>Deployment - Clusters </a:t>
-            </a:r>
-            <a:r>
-              <a:rPr lang="en-US" dirty="0" smtClean="0">
-                <a:latin typeface="Segoe UI Light" panose="020B0502040204020203" pitchFamily="34" charset="0"/>
-                <a:cs typeface="Segoe UI Light" panose="020B0502040204020203" pitchFamily="34" charset="0"/>
-              </a:rPr>
-              <a:t>and Nodes</a:t>
+              <a:t>Deployment - Clusters and Nodes</a:t>
             </a:r>
             <a:endParaRPr lang="en-US" dirty="0">
               <a:latin typeface="Segoe UI Light" panose="020B0502040204020203" pitchFamily="34" charset="0"/>
@@ -33701,6 +32559,274 @@
 </p:sld>
 </file>
 
+<file path=ppt/slides/slide36.xml><?xml version="1.0" encoding="utf-8"?>
+<p:sld xmlns:a="http://schemas.openxmlformats.org/drawingml/2006/main" xmlns:r="http://schemas.openxmlformats.org/officeDocument/2006/relationships" xmlns:p="http://schemas.openxmlformats.org/presentationml/2006/main">
+  <p:cSld>
+    <p:spTree>
+      <p:nvGrpSpPr>
+        <p:cNvPr id="1" name=""/>
+        <p:cNvGrpSpPr/>
+        <p:nvPr/>
+      </p:nvGrpSpPr>
+      <p:grpSpPr>
+        <a:xfrm>
+          <a:off x="0" y="0"/>
+          <a:ext cx="0" cy="0"/>
+          <a:chOff x="0" y="0"/>
+          <a:chExt cx="0" cy="0"/>
+        </a:xfrm>
+      </p:grpSpPr>
+      <p:pic>
+        <p:nvPicPr>
+          <p:cNvPr id="4" name="Picture 3"/>
+          <p:cNvPicPr>
+            <a:picLocks noChangeAspect="1"/>
+          </p:cNvPicPr>
+          <p:nvPr/>
+        </p:nvPicPr>
+        <p:blipFill>
+          <a:blip r:embed="rId2">
+            <a:extLst>
+              <a:ext uri="{28A0092B-C50C-407E-A947-70E740481C1C}">
+                <a14:useLocalDpi xmlns:a14="http://schemas.microsoft.com/office/drawing/2010/main" val="0"/>
+              </a:ext>
+            </a:extLst>
+          </a:blip>
+          <a:stretch>
+            <a:fillRect/>
+          </a:stretch>
+        </p:blipFill>
+        <p:spPr>
+          <a:xfrm>
+            <a:off x="0" y="622761"/>
+            <a:ext cx="12192000" cy="5612477"/>
+          </a:xfrm>
+          <a:prstGeom prst="rect">
+            <a:avLst/>
+          </a:prstGeom>
+        </p:spPr>
+      </p:pic>
+    </p:spTree>
+    <p:extLst>
+      <p:ext uri="{BB962C8B-B14F-4D97-AF65-F5344CB8AC3E}">
+        <p14:creationId xmlns:p14="http://schemas.microsoft.com/office/powerpoint/2010/main" val="877605111"/>
+      </p:ext>
+    </p:extLst>
+  </p:cSld>
+  <p:clrMapOvr>
+    <a:masterClrMapping/>
+  </p:clrMapOvr>
+  <p:timing>
+    <p:tnLst>
+      <p:par>
+        <p:cTn id="1" dur="indefinite" restart="never" nodeType="tmRoot"/>
+      </p:par>
+    </p:tnLst>
+  </p:timing>
+</p:sld>
+</file>
+
+<file path=ppt/slides/slide37.xml><?xml version="1.0" encoding="utf-8"?>
+<p:sld xmlns:a="http://schemas.openxmlformats.org/drawingml/2006/main" xmlns:r="http://schemas.openxmlformats.org/officeDocument/2006/relationships" xmlns:p="http://schemas.openxmlformats.org/presentationml/2006/main">
+  <p:cSld>
+    <p:spTree>
+      <p:nvGrpSpPr>
+        <p:cNvPr id="1" name=""/>
+        <p:cNvGrpSpPr/>
+        <p:nvPr/>
+      </p:nvGrpSpPr>
+      <p:grpSpPr>
+        <a:xfrm>
+          <a:off x="0" y="0"/>
+          <a:ext cx="0" cy="0"/>
+          <a:chOff x="0" y="0"/>
+          <a:chExt cx="0" cy="0"/>
+        </a:xfrm>
+      </p:grpSpPr>
+      <p:pic>
+        <p:nvPicPr>
+          <p:cNvPr id="5" name="Picture 4"/>
+          <p:cNvPicPr>
+            <a:picLocks noChangeAspect="1"/>
+          </p:cNvPicPr>
+          <p:nvPr/>
+        </p:nvPicPr>
+        <p:blipFill>
+          <a:blip r:embed="rId2">
+            <a:extLst>
+              <a:ext uri="{28A0092B-C50C-407E-A947-70E740481C1C}">
+                <a14:useLocalDpi xmlns:a14="http://schemas.microsoft.com/office/drawing/2010/main" val="0"/>
+              </a:ext>
+            </a:extLst>
+          </a:blip>
+          <a:stretch>
+            <a:fillRect/>
+          </a:stretch>
+        </p:blipFill>
+        <p:spPr>
+          <a:xfrm>
+            <a:off x="0" y="622761"/>
+            <a:ext cx="12192000" cy="5612477"/>
+          </a:xfrm>
+          <a:prstGeom prst="rect">
+            <a:avLst/>
+          </a:prstGeom>
+        </p:spPr>
+      </p:pic>
+    </p:spTree>
+    <p:extLst>
+      <p:ext uri="{BB962C8B-B14F-4D97-AF65-F5344CB8AC3E}">
+        <p14:creationId xmlns:p14="http://schemas.microsoft.com/office/powerpoint/2010/main" val="2982697097"/>
+      </p:ext>
+    </p:extLst>
+  </p:cSld>
+  <p:clrMapOvr>
+    <a:masterClrMapping/>
+  </p:clrMapOvr>
+  <p:timing>
+    <p:tnLst>
+      <p:par>
+        <p:cTn id="1" dur="indefinite" restart="never" nodeType="tmRoot"/>
+      </p:par>
+    </p:tnLst>
+  </p:timing>
+</p:sld>
+</file>
+
+<file path=ppt/slides/slide38.xml><?xml version="1.0" encoding="utf-8"?>
+<p:sld xmlns:a="http://schemas.openxmlformats.org/drawingml/2006/main" xmlns:r="http://schemas.openxmlformats.org/officeDocument/2006/relationships" xmlns:p="http://schemas.openxmlformats.org/presentationml/2006/main">
+  <p:cSld>
+    <p:spTree>
+      <p:nvGrpSpPr>
+        <p:cNvPr id="1" name=""/>
+        <p:cNvGrpSpPr/>
+        <p:nvPr/>
+      </p:nvGrpSpPr>
+      <p:grpSpPr>
+        <a:xfrm>
+          <a:off x="0" y="0"/>
+          <a:ext cx="0" cy="0"/>
+          <a:chOff x="0" y="0"/>
+          <a:chExt cx="0" cy="0"/>
+        </a:xfrm>
+      </p:grpSpPr>
+      <p:pic>
+        <p:nvPicPr>
+          <p:cNvPr id="2" name="Picture 1"/>
+          <p:cNvPicPr>
+            <a:picLocks noChangeAspect="1"/>
+          </p:cNvPicPr>
+          <p:nvPr/>
+        </p:nvPicPr>
+        <p:blipFill>
+          <a:blip r:embed="rId2">
+            <a:extLst>
+              <a:ext uri="{28A0092B-C50C-407E-A947-70E740481C1C}">
+                <a14:useLocalDpi xmlns:a14="http://schemas.microsoft.com/office/drawing/2010/main" val="0"/>
+              </a:ext>
+            </a:extLst>
+          </a:blip>
+          <a:stretch>
+            <a:fillRect/>
+          </a:stretch>
+        </p:blipFill>
+        <p:spPr>
+          <a:xfrm>
+            <a:off x="0" y="622761"/>
+            <a:ext cx="12192000" cy="5612477"/>
+          </a:xfrm>
+          <a:prstGeom prst="rect">
+            <a:avLst/>
+          </a:prstGeom>
+        </p:spPr>
+      </p:pic>
+    </p:spTree>
+    <p:extLst>
+      <p:ext uri="{BB962C8B-B14F-4D97-AF65-F5344CB8AC3E}">
+        <p14:creationId xmlns:p14="http://schemas.microsoft.com/office/powerpoint/2010/main" val="1758124592"/>
+      </p:ext>
+    </p:extLst>
+  </p:cSld>
+  <p:clrMapOvr>
+    <a:masterClrMapping/>
+  </p:clrMapOvr>
+  <p:timing>
+    <p:tnLst>
+      <p:par>
+        <p:cTn id="1" dur="indefinite" restart="never" nodeType="tmRoot"/>
+      </p:par>
+    </p:tnLst>
+  </p:timing>
+</p:sld>
+</file>
+
+<file path=ppt/slides/slide39.xml><?xml version="1.0" encoding="utf-8"?>
+<p:sld xmlns:a="http://schemas.openxmlformats.org/drawingml/2006/main" xmlns:r="http://schemas.openxmlformats.org/officeDocument/2006/relationships" xmlns:p="http://schemas.openxmlformats.org/presentationml/2006/main">
+  <p:cSld>
+    <p:spTree>
+      <p:nvGrpSpPr>
+        <p:cNvPr id="1" name=""/>
+        <p:cNvGrpSpPr/>
+        <p:nvPr/>
+      </p:nvGrpSpPr>
+      <p:grpSpPr>
+        <a:xfrm>
+          <a:off x="0" y="0"/>
+          <a:ext cx="0" cy="0"/>
+          <a:chOff x="0" y="0"/>
+          <a:chExt cx="0" cy="0"/>
+        </a:xfrm>
+      </p:grpSpPr>
+      <p:pic>
+        <p:nvPicPr>
+          <p:cNvPr id="3" name="Picture 2"/>
+          <p:cNvPicPr>
+            <a:picLocks noChangeAspect="1"/>
+          </p:cNvPicPr>
+          <p:nvPr/>
+        </p:nvPicPr>
+        <p:blipFill>
+          <a:blip r:embed="rId2">
+            <a:extLst>
+              <a:ext uri="{28A0092B-C50C-407E-A947-70E740481C1C}">
+                <a14:useLocalDpi xmlns:a14="http://schemas.microsoft.com/office/drawing/2010/main" val="0"/>
+              </a:ext>
+            </a:extLst>
+          </a:blip>
+          <a:stretch>
+            <a:fillRect/>
+          </a:stretch>
+        </p:blipFill>
+        <p:spPr>
+          <a:xfrm>
+            <a:off x="0" y="622761"/>
+            <a:ext cx="12192000" cy="5612477"/>
+          </a:xfrm>
+          <a:prstGeom prst="rect">
+            <a:avLst/>
+          </a:prstGeom>
+        </p:spPr>
+      </p:pic>
+    </p:spTree>
+    <p:extLst>
+      <p:ext uri="{BB962C8B-B14F-4D97-AF65-F5344CB8AC3E}">
+        <p14:creationId xmlns:p14="http://schemas.microsoft.com/office/powerpoint/2010/main" val="2165126420"/>
+      </p:ext>
+    </p:extLst>
+  </p:cSld>
+  <p:clrMapOvr>
+    <a:masterClrMapping/>
+  </p:clrMapOvr>
+  <p:timing>
+    <p:tnLst>
+      <p:par>
+        <p:cTn id="1" dur="indefinite" restart="never" nodeType="tmRoot"/>
+      </p:par>
+    </p:tnLst>
+  </p:timing>
+</p:sld>
+</file>
+
 <file path=ppt/slides/slide4.xml><?xml version="1.0" encoding="utf-8"?>
 <p:sld xmlns:a="http://schemas.openxmlformats.org/drawingml/2006/main" xmlns:r="http://schemas.openxmlformats.org/officeDocument/2006/relationships" xmlns:p="http://schemas.openxmlformats.org/presentationml/2006/main">
   <p:cSld>
@@ -35162,6 +34288,676 @@
 </p:sld>
 </file>
 
+<file path=ppt/slides/slide40.xml><?xml version="1.0" encoding="utf-8"?>
+<p:sld xmlns:a="http://schemas.openxmlformats.org/drawingml/2006/main" xmlns:r="http://schemas.openxmlformats.org/officeDocument/2006/relationships" xmlns:p="http://schemas.openxmlformats.org/presentationml/2006/main">
+  <p:cSld>
+    <p:spTree>
+      <p:nvGrpSpPr>
+        <p:cNvPr id="1" name=""/>
+        <p:cNvGrpSpPr/>
+        <p:nvPr/>
+      </p:nvGrpSpPr>
+      <p:grpSpPr>
+        <a:xfrm>
+          <a:off x="0" y="0"/>
+          <a:ext cx="0" cy="0"/>
+          <a:chOff x="0" y="0"/>
+          <a:chExt cx="0" cy="0"/>
+        </a:xfrm>
+      </p:grpSpPr>
+      <p:pic>
+        <p:nvPicPr>
+          <p:cNvPr id="2" name="Picture 1"/>
+          <p:cNvPicPr>
+            <a:picLocks noChangeAspect="1"/>
+          </p:cNvPicPr>
+          <p:nvPr/>
+        </p:nvPicPr>
+        <p:blipFill>
+          <a:blip r:embed="rId2">
+            <a:extLst>
+              <a:ext uri="{28A0092B-C50C-407E-A947-70E740481C1C}">
+                <a14:useLocalDpi xmlns:a14="http://schemas.microsoft.com/office/drawing/2010/main" val="0"/>
+              </a:ext>
+            </a:extLst>
+          </a:blip>
+          <a:stretch>
+            <a:fillRect/>
+          </a:stretch>
+        </p:blipFill>
+        <p:spPr>
+          <a:xfrm>
+            <a:off x="0" y="622761"/>
+            <a:ext cx="12192000" cy="5612477"/>
+          </a:xfrm>
+          <a:prstGeom prst="rect">
+            <a:avLst/>
+          </a:prstGeom>
+        </p:spPr>
+      </p:pic>
+    </p:spTree>
+    <p:extLst>
+      <p:ext uri="{BB962C8B-B14F-4D97-AF65-F5344CB8AC3E}">
+        <p14:creationId xmlns:p14="http://schemas.microsoft.com/office/powerpoint/2010/main" val="3098415914"/>
+      </p:ext>
+    </p:extLst>
+  </p:cSld>
+  <p:clrMapOvr>
+    <a:masterClrMapping/>
+  </p:clrMapOvr>
+  <p:timing>
+    <p:tnLst>
+      <p:par>
+        <p:cTn id="1" dur="indefinite" restart="never" nodeType="tmRoot"/>
+      </p:par>
+    </p:tnLst>
+  </p:timing>
+</p:sld>
+</file>
+
+<file path=ppt/slides/slide41.xml><?xml version="1.0" encoding="utf-8"?>
+<p:sld xmlns:a="http://schemas.openxmlformats.org/drawingml/2006/main" xmlns:r="http://schemas.openxmlformats.org/officeDocument/2006/relationships" xmlns:p="http://schemas.openxmlformats.org/presentationml/2006/main">
+  <p:cSld>
+    <p:spTree>
+      <p:nvGrpSpPr>
+        <p:cNvPr id="1" name=""/>
+        <p:cNvGrpSpPr/>
+        <p:nvPr/>
+      </p:nvGrpSpPr>
+      <p:grpSpPr>
+        <a:xfrm>
+          <a:off x="0" y="0"/>
+          <a:ext cx="0" cy="0"/>
+          <a:chOff x="0" y="0"/>
+          <a:chExt cx="0" cy="0"/>
+        </a:xfrm>
+      </p:grpSpPr>
+      <p:pic>
+        <p:nvPicPr>
+          <p:cNvPr id="3" name="Picture 2"/>
+          <p:cNvPicPr>
+            <a:picLocks noChangeAspect="1"/>
+          </p:cNvPicPr>
+          <p:nvPr/>
+        </p:nvPicPr>
+        <p:blipFill>
+          <a:blip r:embed="rId2">
+            <a:extLst>
+              <a:ext uri="{28A0092B-C50C-407E-A947-70E740481C1C}">
+                <a14:useLocalDpi xmlns:a14="http://schemas.microsoft.com/office/drawing/2010/main" val="0"/>
+              </a:ext>
+            </a:extLst>
+          </a:blip>
+          <a:stretch>
+            <a:fillRect/>
+          </a:stretch>
+        </p:blipFill>
+        <p:spPr>
+          <a:xfrm>
+            <a:off x="0" y="622761"/>
+            <a:ext cx="12192000" cy="5612477"/>
+          </a:xfrm>
+          <a:prstGeom prst="rect">
+            <a:avLst/>
+          </a:prstGeom>
+        </p:spPr>
+      </p:pic>
+    </p:spTree>
+    <p:extLst>
+      <p:ext uri="{BB962C8B-B14F-4D97-AF65-F5344CB8AC3E}">
+        <p14:creationId xmlns:p14="http://schemas.microsoft.com/office/powerpoint/2010/main" val="1041965423"/>
+      </p:ext>
+    </p:extLst>
+  </p:cSld>
+  <p:clrMapOvr>
+    <a:masterClrMapping/>
+  </p:clrMapOvr>
+  <p:timing>
+    <p:tnLst>
+      <p:par>
+        <p:cTn id="1" dur="indefinite" restart="never" nodeType="tmRoot"/>
+      </p:par>
+    </p:tnLst>
+  </p:timing>
+</p:sld>
+</file>
+
+<file path=ppt/slides/slide42.xml><?xml version="1.0" encoding="utf-8"?>
+<p:sld xmlns:a="http://schemas.openxmlformats.org/drawingml/2006/main" xmlns:r="http://schemas.openxmlformats.org/officeDocument/2006/relationships" xmlns:p="http://schemas.openxmlformats.org/presentationml/2006/main">
+  <p:cSld>
+    <p:spTree>
+      <p:nvGrpSpPr>
+        <p:cNvPr id="1" name=""/>
+        <p:cNvGrpSpPr/>
+        <p:nvPr/>
+      </p:nvGrpSpPr>
+      <p:grpSpPr>
+        <a:xfrm>
+          <a:off x="0" y="0"/>
+          <a:ext cx="0" cy="0"/>
+          <a:chOff x="0" y="0"/>
+          <a:chExt cx="0" cy="0"/>
+        </a:xfrm>
+      </p:grpSpPr>
+      <p:pic>
+        <p:nvPicPr>
+          <p:cNvPr id="2" name="Picture 1"/>
+          <p:cNvPicPr>
+            <a:picLocks noChangeAspect="1"/>
+          </p:cNvPicPr>
+          <p:nvPr/>
+        </p:nvPicPr>
+        <p:blipFill>
+          <a:blip r:embed="rId2">
+            <a:extLst>
+              <a:ext uri="{28A0092B-C50C-407E-A947-70E740481C1C}">
+                <a14:useLocalDpi xmlns:a14="http://schemas.microsoft.com/office/drawing/2010/main" val="0"/>
+              </a:ext>
+            </a:extLst>
+          </a:blip>
+          <a:stretch>
+            <a:fillRect/>
+          </a:stretch>
+        </p:blipFill>
+        <p:spPr>
+          <a:xfrm>
+            <a:off x="0" y="622761"/>
+            <a:ext cx="12192000" cy="5612477"/>
+          </a:xfrm>
+          <a:prstGeom prst="rect">
+            <a:avLst/>
+          </a:prstGeom>
+        </p:spPr>
+      </p:pic>
+    </p:spTree>
+    <p:extLst>
+      <p:ext uri="{BB962C8B-B14F-4D97-AF65-F5344CB8AC3E}">
+        <p14:creationId xmlns:p14="http://schemas.microsoft.com/office/powerpoint/2010/main" val="2892993819"/>
+      </p:ext>
+    </p:extLst>
+  </p:cSld>
+  <p:clrMapOvr>
+    <a:masterClrMapping/>
+  </p:clrMapOvr>
+  <p:timing>
+    <p:tnLst>
+      <p:par>
+        <p:cTn id="1" dur="indefinite" restart="never" nodeType="tmRoot"/>
+      </p:par>
+    </p:tnLst>
+  </p:timing>
+</p:sld>
+</file>
+
+<file path=ppt/slides/slide43.xml><?xml version="1.0" encoding="utf-8"?>
+<p:sld xmlns:a="http://schemas.openxmlformats.org/drawingml/2006/main" xmlns:r="http://schemas.openxmlformats.org/officeDocument/2006/relationships" xmlns:p="http://schemas.openxmlformats.org/presentationml/2006/main">
+  <p:cSld>
+    <p:spTree>
+      <p:nvGrpSpPr>
+        <p:cNvPr id="1" name=""/>
+        <p:cNvGrpSpPr/>
+        <p:nvPr/>
+      </p:nvGrpSpPr>
+      <p:grpSpPr>
+        <a:xfrm>
+          <a:off x="0" y="0"/>
+          <a:ext cx="0" cy="0"/>
+          <a:chOff x="0" y="0"/>
+          <a:chExt cx="0" cy="0"/>
+        </a:xfrm>
+      </p:grpSpPr>
+      <p:pic>
+        <p:nvPicPr>
+          <p:cNvPr id="3" name="Picture 2"/>
+          <p:cNvPicPr>
+            <a:picLocks noChangeAspect="1"/>
+          </p:cNvPicPr>
+          <p:nvPr/>
+        </p:nvPicPr>
+        <p:blipFill>
+          <a:blip r:embed="rId2">
+            <a:extLst>
+              <a:ext uri="{28A0092B-C50C-407E-A947-70E740481C1C}">
+                <a14:useLocalDpi xmlns:a14="http://schemas.microsoft.com/office/drawing/2010/main" val="0"/>
+              </a:ext>
+            </a:extLst>
+          </a:blip>
+          <a:stretch>
+            <a:fillRect/>
+          </a:stretch>
+        </p:blipFill>
+        <p:spPr>
+          <a:xfrm>
+            <a:off x="0" y="622761"/>
+            <a:ext cx="12192000" cy="5612477"/>
+          </a:xfrm>
+          <a:prstGeom prst="rect">
+            <a:avLst/>
+          </a:prstGeom>
+        </p:spPr>
+      </p:pic>
+    </p:spTree>
+    <p:extLst>
+      <p:ext uri="{BB962C8B-B14F-4D97-AF65-F5344CB8AC3E}">
+        <p14:creationId xmlns:p14="http://schemas.microsoft.com/office/powerpoint/2010/main" val="1164823500"/>
+      </p:ext>
+    </p:extLst>
+  </p:cSld>
+  <p:clrMapOvr>
+    <a:masterClrMapping/>
+  </p:clrMapOvr>
+  <p:timing>
+    <p:tnLst>
+      <p:par>
+        <p:cTn id="1" dur="indefinite" restart="never" nodeType="tmRoot"/>
+      </p:par>
+    </p:tnLst>
+  </p:timing>
+</p:sld>
+</file>
+
+<file path=ppt/slides/slide44.xml><?xml version="1.0" encoding="utf-8"?>
+<p:sld xmlns:a="http://schemas.openxmlformats.org/drawingml/2006/main" xmlns:r="http://schemas.openxmlformats.org/officeDocument/2006/relationships" xmlns:p="http://schemas.openxmlformats.org/presentationml/2006/main">
+  <p:cSld>
+    <p:spTree>
+      <p:nvGrpSpPr>
+        <p:cNvPr id="1" name=""/>
+        <p:cNvGrpSpPr/>
+        <p:nvPr/>
+      </p:nvGrpSpPr>
+      <p:grpSpPr>
+        <a:xfrm>
+          <a:off x="0" y="0"/>
+          <a:ext cx="0" cy="0"/>
+          <a:chOff x="0" y="0"/>
+          <a:chExt cx="0" cy="0"/>
+        </a:xfrm>
+      </p:grpSpPr>
+      <p:pic>
+        <p:nvPicPr>
+          <p:cNvPr id="2" name="Picture 1"/>
+          <p:cNvPicPr>
+            <a:picLocks noChangeAspect="1"/>
+          </p:cNvPicPr>
+          <p:nvPr/>
+        </p:nvPicPr>
+        <p:blipFill>
+          <a:blip r:embed="rId2">
+            <a:extLst>
+              <a:ext uri="{28A0092B-C50C-407E-A947-70E740481C1C}">
+                <a14:useLocalDpi xmlns:a14="http://schemas.microsoft.com/office/drawing/2010/main" val="0"/>
+              </a:ext>
+            </a:extLst>
+          </a:blip>
+          <a:stretch>
+            <a:fillRect/>
+          </a:stretch>
+        </p:blipFill>
+        <p:spPr>
+          <a:xfrm>
+            <a:off x="0" y="622761"/>
+            <a:ext cx="12192000" cy="5612477"/>
+          </a:xfrm>
+          <a:prstGeom prst="rect">
+            <a:avLst/>
+          </a:prstGeom>
+        </p:spPr>
+      </p:pic>
+    </p:spTree>
+    <p:extLst>
+      <p:ext uri="{BB962C8B-B14F-4D97-AF65-F5344CB8AC3E}">
+        <p14:creationId xmlns:p14="http://schemas.microsoft.com/office/powerpoint/2010/main" val="1212487426"/>
+      </p:ext>
+    </p:extLst>
+  </p:cSld>
+  <p:clrMapOvr>
+    <a:masterClrMapping/>
+  </p:clrMapOvr>
+  <p:timing>
+    <p:tnLst>
+      <p:par>
+        <p:cTn id="1" dur="indefinite" restart="never" nodeType="tmRoot"/>
+      </p:par>
+    </p:tnLst>
+  </p:timing>
+</p:sld>
+</file>
+
+<file path=ppt/slides/slide45.xml><?xml version="1.0" encoding="utf-8"?>
+<p:sld xmlns:a="http://schemas.openxmlformats.org/drawingml/2006/main" xmlns:r="http://schemas.openxmlformats.org/officeDocument/2006/relationships" xmlns:p="http://schemas.openxmlformats.org/presentationml/2006/main">
+  <p:cSld>
+    <p:spTree>
+      <p:nvGrpSpPr>
+        <p:cNvPr id="1" name=""/>
+        <p:cNvGrpSpPr/>
+        <p:nvPr/>
+      </p:nvGrpSpPr>
+      <p:grpSpPr>
+        <a:xfrm>
+          <a:off x="0" y="0"/>
+          <a:ext cx="0" cy="0"/>
+          <a:chOff x="0" y="0"/>
+          <a:chExt cx="0" cy="0"/>
+        </a:xfrm>
+      </p:grpSpPr>
+      <p:pic>
+        <p:nvPicPr>
+          <p:cNvPr id="3" name="Picture 2"/>
+          <p:cNvPicPr>
+            <a:picLocks noChangeAspect="1"/>
+          </p:cNvPicPr>
+          <p:nvPr/>
+        </p:nvPicPr>
+        <p:blipFill>
+          <a:blip r:embed="rId2">
+            <a:extLst>
+              <a:ext uri="{28A0092B-C50C-407E-A947-70E740481C1C}">
+                <a14:useLocalDpi xmlns:a14="http://schemas.microsoft.com/office/drawing/2010/main" val="0"/>
+              </a:ext>
+            </a:extLst>
+          </a:blip>
+          <a:stretch>
+            <a:fillRect/>
+          </a:stretch>
+        </p:blipFill>
+        <p:spPr>
+          <a:xfrm>
+            <a:off x="0" y="622761"/>
+            <a:ext cx="12192000" cy="5612477"/>
+          </a:xfrm>
+          <a:prstGeom prst="rect">
+            <a:avLst/>
+          </a:prstGeom>
+        </p:spPr>
+      </p:pic>
+    </p:spTree>
+    <p:extLst>
+      <p:ext uri="{BB962C8B-B14F-4D97-AF65-F5344CB8AC3E}">
+        <p14:creationId xmlns:p14="http://schemas.microsoft.com/office/powerpoint/2010/main" val="3744615653"/>
+      </p:ext>
+    </p:extLst>
+  </p:cSld>
+  <p:clrMapOvr>
+    <a:masterClrMapping/>
+  </p:clrMapOvr>
+  <p:timing>
+    <p:tnLst>
+      <p:par>
+        <p:cTn id="1" dur="indefinite" restart="never" nodeType="tmRoot"/>
+      </p:par>
+    </p:tnLst>
+  </p:timing>
+</p:sld>
+</file>
+
+<file path=ppt/slides/slide46.xml><?xml version="1.0" encoding="utf-8"?>
+<p:sld xmlns:a="http://schemas.openxmlformats.org/drawingml/2006/main" xmlns:r="http://schemas.openxmlformats.org/officeDocument/2006/relationships" xmlns:p="http://schemas.openxmlformats.org/presentationml/2006/main">
+  <p:cSld>
+    <p:spTree>
+      <p:nvGrpSpPr>
+        <p:cNvPr id="1" name=""/>
+        <p:cNvGrpSpPr/>
+        <p:nvPr/>
+      </p:nvGrpSpPr>
+      <p:grpSpPr>
+        <a:xfrm>
+          <a:off x="0" y="0"/>
+          <a:ext cx="0" cy="0"/>
+          <a:chOff x="0" y="0"/>
+          <a:chExt cx="0" cy="0"/>
+        </a:xfrm>
+      </p:grpSpPr>
+      <p:pic>
+        <p:nvPicPr>
+          <p:cNvPr id="2" name="Picture 1"/>
+          <p:cNvPicPr>
+            <a:picLocks noChangeAspect="1"/>
+          </p:cNvPicPr>
+          <p:nvPr/>
+        </p:nvPicPr>
+        <p:blipFill>
+          <a:blip r:embed="rId2">
+            <a:extLst>
+              <a:ext uri="{28A0092B-C50C-407E-A947-70E740481C1C}">
+                <a14:useLocalDpi xmlns:a14="http://schemas.microsoft.com/office/drawing/2010/main" val="0"/>
+              </a:ext>
+            </a:extLst>
+          </a:blip>
+          <a:stretch>
+            <a:fillRect/>
+          </a:stretch>
+        </p:blipFill>
+        <p:spPr>
+          <a:xfrm>
+            <a:off x="0" y="622761"/>
+            <a:ext cx="12192000" cy="5612477"/>
+          </a:xfrm>
+          <a:prstGeom prst="rect">
+            <a:avLst/>
+          </a:prstGeom>
+        </p:spPr>
+      </p:pic>
+    </p:spTree>
+    <p:extLst>
+      <p:ext uri="{BB962C8B-B14F-4D97-AF65-F5344CB8AC3E}">
+        <p14:creationId xmlns:p14="http://schemas.microsoft.com/office/powerpoint/2010/main" val="2843000738"/>
+      </p:ext>
+    </p:extLst>
+  </p:cSld>
+  <p:clrMapOvr>
+    <a:masterClrMapping/>
+  </p:clrMapOvr>
+  <p:timing>
+    <p:tnLst>
+      <p:par>
+        <p:cTn id="1" dur="indefinite" restart="never" nodeType="tmRoot"/>
+      </p:par>
+    </p:tnLst>
+  </p:timing>
+</p:sld>
+</file>
+
+<file path=ppt/slides/slide47.xml><?xml version="1.0" encoding="utf-8"?>
+<p:sld xmlns:a="http://schemas.openxmlformats.org/drawingml/2006/main" xmlns:r="http://schemas.openxmlformats.org/officeDocument/2006/relationships" xmlns:p="http://schemas.openxmlformats.org/presentationml/2006/main">
+  <p:cSld>
+    <p:spTree>
+      <p:nvGrpSpPr>
+        <p:cNvPr id="1" name=""/>
+        <p:cNvGrpSpPr/>
+        <p:nvPr/>
+      </p:nvGrpSpPr>
+      <p:grpSpPr>
+        <a:xfrm>
+          <a:off x="0" y="0"/>
+          <a:ext cx="0" cy="0"/>
+          <a:chOff x="0" y="0"/>
+          <a:chExt cx="0" cy="0"/>
+        </a:xfrm>
+      </p:grpSpPr>
+      <p:pic>
+        <p:nvPicPr>
+          <p:cNvPr id="3" name="Picture 2"/>
+          <p:cNvPicPr>
+            <a:picLocks noChangeAspect="1"/>
+          </p:cNvPicPr>
+          <p:nvPr/>
+        </p:nvPicPr>
+        <p:blipFill>
+          <a:blip r:embed="rId2">
+            <a:extLst>
+              <a:ext uri="{28A0092B-C50C-407E-A947-70E740481C1C}">
+                <a14:useLocalDpi xmlns:a14="http://schemas.microsoft.com/office/drawing/2010/main" val="0"/>
+              </a:ext>
+            </a:extLst>
+          </a:blip>
+          <a:stretch>
+            <a:fillRect/>
+          </a:stretch>
+        </p:blipFill>
+        <p:spPr>
+          <a:xfrm>
+            <a:off x="0" y="622761"/>
+            <a:ext cx="12192000" cy="5612477"/>
+          </a:xfrm>
+          <a:prstGeom prst="rect">
+            <a:avLst/>
+          </a:prstGeom>
+        </p:spPr>
+      </p:pic>
+    </p:spTree>
+    <p:extLst>
+      <p:ext uri="{BB962C8B-B14F-4D97-AF65-F5344CB8AC3E}">
+        <p14:creationId xmlns:p14="http://schemas.microsoft.com/office/powerpoint/2010/main" val="658221313"/>
+      </p:ext>
+    </p:extLst>
+  </p:cSld>
+  <p:clrMapOvr>
+    <a:masterClrMapping/>
+  </p:clrMapOvr>
+  <p:timing>
+    <p:tnLst>
+      <p:par>
+        <p:cTn id="1" dur="indefinite" restart="never" nodeType="tmRoot"/>
+      </p:par>
+    </p:tnLst>
+  </p:timing>
+</p:sld>
+</file>
+
+<file path=ppt/slides/slide48.xml><?xml version="1.0" encoding="utf-8"?>
+<p:sld xmlns:a="http://schemas.openxmlformats.org/drawingml/2006/main" xmlns:r="http://schemas.openxmlformats.org/officeDocument/2006/relationships" xmlns:p="http://schemas.openxmlformats.org/presentationml/2006/main">
+  <p:cSld>
+    <p:spTree>
+      <p:nvGrpSpPr>
+        <p:cNvPr id="1" name=""/>
+        <p:cNvGrpSpPr/>
+        <p:nvPr/>
+      </p:nvGrpSpPr>
+      <p:grpSpPr>
+        <a:xfrm>
+          <a:off x="0" y="0"/>
+          <a:ext cx="0" cy="0"/>
+          <a:chOff x="0" y="0"/>
+          <a:chExt cx="0" cy="0"/>
+        </a:xfrm>
+      </p:grpSpPr>
+      <p:pic>
+        <p:nvPicPr>
+          <p:cNvPr id="2" name="Picture 1"/>
+          <p:cNvPicPr>
+            <a:picLocks noChangeAspect="1"/>
+          </p:cNvPicPr>
+          <p:nvPr/>
+        </p:nvPicPr>
+        <p:blipFill>
+          <a:blip r:embed="rId2">
+            <a:extLst>
+              <a:ext uri="{28A0092B-C50C-407E-A947-70E740481C1C}">
+                <a14:useLocalDpi xmlns:a14="http://schemas.microsoft.com/office/drawing/2010/main" val="0"/>
+              </a:ext>
+            </a:extLst>
+          </a:blip>
+          <a:stretch>
+            <a:fillRect/>
+          </a:stretch>
+        </p:blipFill>
+        <p:spPr>
+          <a:xfrm>
+            <a:off x="0" y="179885"/>
+            <a:ext cx="12192000" cy="6498229"/>
+          </a:xfrm>
+          <a:prstGeom prst="rect">
+            <a:avLst/>
+          </a:prstGeom>
+        </p:spPr>
+      </p:pic>
+    </p:spTree>
+    <p:extLst>
+      <p:ext uri="{BB962C8B-B14F-4D97-AF65-F5344CB8AC3E}">
+        <p14:creationId xmlns:p14="http://schemas.microsoft.com/office/powerpoint/2010/main" val="501572545"/>
+      </p:ext>
+    </p:extLst>
+  </p:cSld>
+  <p:clrMapOvr>
+    <a:masterClrMapping/>
+  </p:clrMapOvr>
+  <p:timing>
+    <p:tnLst>
+      <p:par>
+        <p:cTn id="1" dur="indefinite" restart="never" nodeType="tmRoot"/>
+      </p:par>
+    </p:tnLst>
+  </p:timing>
+</p:sld>
+</file>
+
+<file path=ppt/slides/slide49.xml><?xml version="1.0" encoding="utf-8"?>
+<p:sld xmlns:a="http://schemas.openxmlformats.org/drawingml/2006/main" xmlns:r="http://schemas.openxmlformats.org/officeDocument/2006/relationships" xmlns:p="http://schemas.openxmlformats.org/presentationml/2006/main">
+  <p:cSld>
+    <p:spTree>
+      <p:nvGrpSpPr>
+        <p:cNvPr id="1" name=""/>
+        <p:cNvGrpSpPr/>
+        <p:nvPr/>
+      </p:nvGrpSpPr>
+      <p:grpSpPr>
+        <a:xfrm>
+          <a:off x="0" y="0"/>
+          <a:ext cx="0" cy="0"/>
+          <a:chOff x="0" y="0"/>
+          <a:chExt cx="0" cy="0"/>
+        </a:xfrm>
+      </p:grpSpPr>
+      <p:pic>
+        <p:nvPicPr>
+          <p:cNvPr id="3" name="Picture 2"/>
+          <p:cNvPicPr>
+            <a:picLocks noChangeAspect="1"/>
+          </p:cNvPicPr>
+          <p:nvPr/>
+        </p:nvPicPr>
+        <p:blipFill>
+          <a:blip r:embed="rId2">
+            <a:extLst>
+              <a:ext uri="{28A0092B-C50C-407E-A947-70E740481C1C}">
+                <a14:useLocalDpi xmlns:a14="http://schemas.microsoft.com/office/drawing/2010/main" val="0"/>
+              </a:ext>
+            </a:extLst>
+          </a:blip>
+          <a:stretch>
+            <a:fillRect/>
+          </a:stretch>
+        </p:blipFill>
+        <p:spPr>
+          <a:xfrm>
+            <a:off x="0" y="622761"/>
+            <a:ext cx="12192000" cy="5612477"/>
+          </a:xfrm>
+          <a:prstGeom prst="rect">
+            <a:avLst/>
+          </a:prstGeom>
+        </p:spPr>
+      </p:pic>
+    </p:spTree>
+    <p:extLst>
+      <p:ext uri="{BB962C8B-B14F-4D97-AF65-F5344CB8AC3E}">
+        <p14:creationId xmlns:p14="http://schemas.microsoft.com/office/powerpoint/2010/main" val="534516221"/>
+      </p:ext>
+    </p:extLst>
+  </p:cSld>
+  <p:clrMapOvr>
+    <a:masterClrMapping/>
+  </p:clrMapOvr>
+  <p:timing>
+    <p:tnLst>
+      <p:par>
+        <p:cTn id="1" dur="indefinite" restart="never" nodeType="tmRoot"/>
+      </p:par>
+    </p:tnLst>
+  </p:timing>
+</p:sld>
+</file>
+
 <file path=ppt/slides/slide5.xml><?xml version="1.0" encoding="utf-8"?>
 <p:sld xmlns:a="http://schemas.openxmlformats.org/drawingml/2006/main" xmlns:r="http://schemas.openxmlformats.org/officeDocument/2006/relationships" xmlns:p="http://schemas.openxmlformats.org/presentationml/2006/main">
   <p:cSld>
@@ -35191,8 +34987,8 @@
         </p:nvSpPr>
         <p:spPr>
           <a:xfrm>
-            <a:off x="838200" y="1164323"/>
-            <a:ext cx="10515600" cy="4609459"/>
+            <a:off x="838200" y="1164324"/>
+            <a:ext cx="10515600" cy="889560"/>
           </a:xfrm>
         </p:spPr>
         <p:txBody>
@@ -35226,7 +35022,7 @@
         </p:nvGrpSpPr>
         <p:grpSpPr>
           <a:xfrm>
-            <a:off x="3951849" y="2053883"/>
+            <a:off x="1037199" y="2053883"/>
             <a:ext cx="4288301" cy="4051496"/>
             <a:chOff x="3951849" y="2321169"/>
             <a:chExt cx="4288301" cy="3784210"/>
@@ -35343,6 +35139,395 @@
           </p:txBody>
         </p:sp>
       </p:grpSp>
+      <p:sp>
+        <p:nvSpPr>
+          <p:cNvPr id="6" name="Content Placeholder 17"/>
+          <p:cNvSpPr txBox="1">
+            <a:spLocks/>
+          </p:cNvSpPr>
+          <p:nvPr/>
+        </p:nvSpPr>
+        <p:spPr>
+          <a:xfrm>
+            <a:off x="5695949" y="2122733"/>
+            <a:ext cx="5829301" cy="3633496"/>
+          </a:xfrm>
+          <a:prstGeom prst="rect">
+            <a:avLst/>
+          </a:prstGeom>
+        </p:spPr>
+        <p:txBody>
+          <a:bodyPr vert="horz" lIns="91440" tIns="45720" rIns="91440" bIns="45720" rtlCol="0">
+            <a:noAutofit/>
+          </a:bodyPr>
+          <a:lstStyle>
+            <a:lvl1pPr marL="228600" indent="-228600" algn="l" defTabSz="914400" rtl="0" eaLnBrk="1" latinLnBrk="0" hangingPunct="1">
+              <a:lnSpc>
+                <a:spcPts val="1800"/>
+              </a:lnSpc>
+              <a:spcBef>
+                <a:spcPts val="1000"/>
+              </a:spcBef>
+              <a:spcAft>
+                <a:spcPts val="1000"/>
+              </a:spcAft>
+              <a:buFont typeface="Arial" panose="020B0604020202020204" pitchFamily="34" charset="0"/>
+              <a:buChar char="•"/>
+              <a:defRPr lang="en-US" sz="1200" kern="1200" smtClean="0">
+                <a:solidFill>
+                  <a:schemeClr val="tx1">
+                    <a:lumMod val="75000"/>
+                    <a:lumOff val="25000"/>
+                  </a:schemeClr>
+                </a:solidFill>
+                <a:latin typeface="+mn-lt"/>
+                <a:ea typeface="+mn-ea"/>
+                <a:cs typeface="+mn-cs"/>
+              </a:defRPr>
+            </a:lvl1pPr>
+            <a:lvl2pPr marL="685800" indent="-228600" algn="l" defTabSz="914400" rtl="0" eaLnBrk="1" latinLnBrk="0" hangingPunct="1">
+              <a:lnSpc>
+                <a:spcPts val="1800"/>
+              </a:lnSpc>
+              <a:spcBef>
+                <a:spcPts val="1000"/>
+              </a:spcBef>
+              <a:spcAft>
+                <a:spcPts val="1000"/>
+              </a:spcAft>
+              <a:buFont typeface="Arial" panose="020B0604020202020204" pitchFamily="34" charset="0"/>
+              <a:buChar char="•"/>
+              <a:defRPr lang="en-US" sz="1200" kern="1200" smtClean="0">
+                <a:solidFill>
+                  <a:schemeClr val="tx1">
+                    <a:lumMod val="75000"/>
+                    <a:lumOff val="25000"/>
+                  </a:schemeClr>
+                </a:solidFill>
+                <a:latin typeface="+mn-lt"/>
+                <a:ea typeface="+mn-ea"/>
+                <a:cs typeface="+mn-cs"/>
+              </a:defRPr>
+            </a:lvl2pPr>
+            <a:lvl3pPr marL="1143000" indent="-228600" algn="l" defTabSz="914400" rtl="0" eaLnBrk="1" latinLnBrk="0" hangingPunct="1">
+              <a:lnSpc>
+                <a:spcPts val="1800"/>
+              </a:lnSpc>
+              <a:spcBef>
+                <a:spcPts val="1000"/>
+              </a:spcBef>
+              <a:spcAft>
+                <a:spcPts val="1000"/>
+              </a:spcAft>
+              <a:buFont typeface="Arial" panose="020B0604020202020204" pitchFamily="34" charset="0"/>
+              <a:buChar char="•"/>
+              <a:defRPr lang="en-US" sz="1200" kern="1200" smtClean="0">
+                <a:solidFill>
+                  <a:schemeClr val="tx1">
+                    <a:lumMod val="75000"/>
+                    <a:lumOff val="25000"/>
+                  </a:schemeClr>
+                </a:solidFill>
+                <a:latin typeface="+mn-lt"/>
+                <a:ea typeface="+mn-ea"/>
+                <a:cs typeface="+mn-cs"/>
+              </a:defRPr>
+            </a:lvl3pPr>
+            <a:lvl4pPr marL="1600200" indent="-228600" algn="l" defTabSz="914400" rtl="0" eaLnBrk="1" latinLnBrk="0" hangingPunct="1">
+              <a:lnSpc>
+                <a:spcPts val="1800"/>
+              </a:lnSpc>
+              <a:spcBef>
+                <a:spcPts val="1000"/>
+              </a:spcBef>
+              <a:spcAft>
+                <a:spcPts val="1000"/>
+              </a:spcAft>
+              <a:buFont typeface="Arial" panose="020B0604020202020204" pitchFamily="34" charset="0"/>
+              <a:buChar char="•"/>
+              <a:defRPr lang="en-US" sz="1200" kern="1200" smtClean="0">
+                <a:solidFill>
+                  <a:schemeClr val="tx1">
+                    <a:lumMod val="75000"/>
+                    <a:lumOff val="25000"/>
+                  </a:schemeClr>
+                </a:solidFill>
+                <a:latin typeface="+mn-lt"/>
+                <a:ea typeface="+mn-ea"/>
+                <a:cs typeface="+mn-cs"/>
+              </a:defRPr>
+            </a:lvl4pPr>
+            <a:lvl5pPr marL="2057400" indent="-228600" algn="l" defTabSz="914400" rtl="0" eaLnBrk="1" latinLnBrk="0" hangingPunct="1">
+              <a:lnSpc>
+                <a:spcPts val="1800"/>
+              </a:lnSpc>
+              <a:spcBef>
+                <a:spcPts val="1000"/>
+              </a:spcBef>
+              <a:spcAft>
+                <a:spcPts val="1000"/>
+              </a:spcAft>
+              <a:buFont typeface="Arial" panose="020B0604020202020204" pitchFamily="34" charset="0"/>
+              <a:buChar char="•"/>
+              <a:defRPr lang="en-US" sz="1200" kern="1200">
+                <a:solidFill>
+                  <a:schemeClr val="tx1">
+                    <a:lumMod val="75000"/>
+                    <a:lumOff val="25000"/>
+                  </a:schemeClr>
+                </a:solidFill>
+                <a:latin typeface="+mn-lt"/>
+                <a:ea typeface="+mn-ea"/>
+                <a:cs typeface="+mn-cs"/>
+              </a:defRPr>
+            </a:lvl5pPr>
+            <a:lvl6pPr marL="2514600" indent="-228600" algn="l" defTabSz="914400" rtl="0" eaLnBrk="1" latinLnBrk="0" hangingPunct="1">
+              <a:lnSpc>
+                <a:spcPct val="90000"/>
+              </a:lnSpc>
+              <a:spcBef>
+                <a:spcPct val="30000"/>
+              </a:spcBef>
+              <a:buFont typeface="Arial" panose="020B0604020202020204" pitchFamily="34" charset="0"/>
+              <a:buChar char="•"/>
+              <a:defRPr sz="1800" kern="1200">
+                <a:solidFill>
+                  <a:schemeClr val="tx1"/>
+                </a:solidFill>
+                <a:latin typeface="+mn-lt"/>
+                <a:ea typeface="+mn-ea"/>
+                <a:cs typeface="+mn-cs"/>
+              </a:defRPr>
+            </a:lvl6pPr>
+            <a:lvl7pPr marL="2971800" indent="-228600" algn="l" defTabSz="914400" rtl="0" eaLnBrk="1" latinLnBrk="0" hangingPunct="1">
+              <a:lnSpc>
+                <a:spcPct val="90000"/>
+              </a:lnSpc>
+              <a:spcBef>
+                <a:spcPct val="30000"/>
+              </a:spcBef>
+              <a:buFont typeface="Arial" panose="020B0604020202020204" pitchFamily="34" charset="0"/>
+              <a:buChar char="•"/>
+              <a:defRPr sz="1800" kern="1200">
+                <a:solidFill>
+                  <a:schemeClr val="tx1"/>
+                </a:solidFill>
+                <a:latin typeface="+mn-lt"/>
+                <a:ea typeface="+mn-ea"/>
+                <a:cs typeface="+mn-cs"/>
+              </a:defRPr>
+            </a:lvl7pPr>
+            <a:lvl8pPr marL="3429000" indent="-228600" algn="l" defTabSz="914400" rtl="0" eaLnBrk="1" latinLnBrk="0" hangingPunct="1">
+              <a:lnSpc>
+                <a:spcPct val="90000"/>
+              </a:lnSpc>
+              <a:spcBef>
+                <a:spcPct val="30000"/>
+              </a:spcBef>
+              <a:buFont typeface="Arial" panose="020B0604020202020204" pitchFamily="34" charset="0"/>
+              <a:buChar char="•"/>
+              <a:defRPr sz="1800" kern="1200">
+                <a:solidFill>
+                  <a:schemeClr val="tx1"/>
+                </a:solidFill>
+                <a:latin typeface="+mn-lt"/>
+                <a:ea typeface="+mn-ea"/>
+                <a:cs typeface="+mn-cs"/>
+              </a:defRPr>
+            </a:lvl8pPr>
+            <a:lvl9pPr marL="3886200" indent="-228600" algn="l" defTabSz="914400" rtl="0" eaLnBrk="1" latinLnBrk="0" hangingPunct="1">
+              <a:lnSpc>
+                <a:spcPct val="90000"/>
+              </a:lnSpc>
+              <a:spcBef>
+                <a:spcPct val="30000"/>
+              </a:spcBef>
+              <a:buFont typeface="Arial" panose="020B0604020202020204" pitchFamily="34" charset="0"/>
+              <a:buChar char="•"/>
+              <a:defRPr sz="1800" kern="1200">
+                <a:solidFill>
+                  <a:schemeClr val="tx1"/>
+                </a:solidFill>
+                <a:latin typeface="+mn-lt"/>
+                <a:ea typeface="+mn-ea"/>
+                <a:cs typeface="+mn-cs"/>
+              </a:defRPr>
+            </a:lvl9pPr>
+          </a:lstStyle>
+          <a:p>
+            <a:pPr marL="0" indent="0">
+              <a:lnSpc>
+                <a:spcPct val="150000"/>
+              </a:lnSpc>
+              <a:spcBef>
+                <a:spcPts val="0"/>
+              </a:spcBef>
+              <a:spcAft>
+                <a:spcPts val="0"/>
+              </a:spcAft>
+              <a:buNone/>
+              <a:defRPr/>
+            </a:pPr>
+            <a:r>
+              <a:rPr lang="en-US" sz="2800" dirty="0" smtClean="0">
+                <a:solidFill>
+                  <a:schemeClr val="bg1"/>
+                </a:solidFill>
+                <a:latin typeface="Segoe UI" panose="020B0502040204020203" pitchFamily="34" charset="0"/>
+                <a:cs typeface="Segoe UI" panose="020B0502040204020203" pitchFamily="34" charset="0"/>
+              </a:rPr>
+              <a:t>Differentiators </a:t>
+            </a:r>
+          </a:p>
+          <a:p>
+            <a:pPr>
+              <a:lnSpc>
+                <a:spcPct val="150000"/>
+              </a:lnSpc>
+              <a:spcBef>
+                <a:spcPts val="0"/>
+              </a:spcBef>
+              <a:spcAft>
+                <a:spcPts val="0"/>
+              </a:spcAft>
+              <a:defRPr/>
+            </a:pPr>
+            <a:r>
+              <a:rPr lang="en-US" sz="2000" dirty="0" smtClean="0">
+                <a:solidFill>
+                  <a:schemeClr val="bg1"/>
+                </a:solidFill>
+                <a:latin typeface="Segoe UI" panose="020B0502040204020203" pitchFamily="34" charset="0"/>
+                <a:cs typeface="Segoe UI" panose="020B0502040204020203" pitchFamily="34" charset="0"/>
+              </a:rPr>
+              <a:t>Application Modeling happens around business capabilities</a:t>
+            </a:r>
+          </a:p>
+          <a:p>
+            <a:pPr>
+              <a:lnSpc>
+                <a:spcPct val="150000"/>
+              </a:lnSpc>
+              <a:spcBef>
+                <a:spcPts val="0"/>
+              </a:spcBef>
+              <a:spcAft>
+                <a:spcPts val="0"/>
+              </a:spcAft>
+              <a:defRPr/>
+            </a:pPr>
+            <a:r>
+              <a:rPr lang="en-US" sz="2000" dirty="0" smtClean="0">
+                <a:solidFill>
+                  <a:schemeClr val="bg1"/>
+                </a:solidFill>
+                <a:latin typeface="Segoe UI" panose="020B0502040204020203" pitchFamily="34" charset="0"/>
+                <a:cs typeface="Segoe UI" panose="020B0502040204020203" pitchFamily="34" charset="0"/>
+              </a:rPr>
+              <a:t>Scope and size defined using </a:t>
+            </a:r>
+            <a:r>
+              <a:rPr lang="en-US" sz="2000" dirty="0">
+                <a:solidFill>
+                  <a:schemeClr val="bg1"/>
+                </a:solidFill>
+                <a:latin typeface="Segoe UI" panose="020B0502040204020203" pitchFamily="34" charset="0"/>
+                <a:cs typeface="Segoe UI" panose="020B0502040204020203" pitchFamily="34" charset="0"/>
+              </a:rPr>
+              <a:t>Bounded </a:t>
+            </a:r>
+            <a:r>
+              <a:rPr lang="en-US" sz="2000" dirty="0" smtClean="0">
+                <a:solidFill>
+                  <a:schemeClr val="bg1"/>
+                </a:solidFill>
+                <a:latin typeface="Segoe UI" panose="020B0502040204020203" pitchFamily="34" charset="0"/>
+                <a:cs typeface="Segoe UI" panose="020B0502040204020203" pitchFamily="34" charset="0"/>
+              </a:rPr>
+              <a:t>context</a:t>
+            </a:r>
+          </a:p>
+          <a:p>
+            <a:pPr>
+              <a:lnSpc>
+                <a:spcPct val="150000"/>
+              </a:lnSpc>
+              <a:spcBef>
+                <a:spcPts val="0"/>
+              </a:spcBef>
+              <a:spcAft>
+                <a:spcPts val="0"/>
+              </a:spcAft>
+              <a:defRPr/>
+            </a:pPr>
+            <a:r>
+              <a:rPr lang="en-US" sz="2000" dirty="0" smtClean="0">
+                <a:solidFill>
+                  <a:schemeClr val="bg1"/>
+                </a:solidFill>
+                <a:latin typeface="Segoe UI" panose="020B0502040204020203" pitchFamily="34" charset="0"/>
+                <a:cs typeface="Segoe UI" panose="020B0502040204020203" pitchFamily="34" charset="0"/>
+              </a:rPr>
+              <a:t>Autonomous Services</a:t>
+            </a:r>
+          </a:p>
+          <a:p>
+            <a:pPr>
+              <a:lnSpc>
+                <a:spcPct val="150000"/>
+              </a:lnSpc>
+              <a:spcBef>
+                <a:spcPts val="0"/>
+              </a:spcBef>
+              <a:spcAft>
+                <a:spcPts val="0"/>
+              </a:spcAft>
+              <a:defRPr/>
+            </a:pPr>
+            <a:r>
+              <a:rPr lang="en-US" sz="2000" dirty="0" smtClean="0">
+                <a:solidFill>
+                  <a:schemeClr val="bg1"/>
+                </a:solidFill>
+                <a:latin typeface="Segoe UI" panose="020B0502040204020203" pitchFamily="34" charset="0"/>
+                <a:cs typeface="Segoe UI" panose="020B0502040204020203" pitchFamily="34" charset="0"/>
+              </a:rPr>
+              <a:t>Lightweight communication</a:t>
+            </a:r>
+          </a:p>
+          <a:p>
+            <a:pPr>
+              <a:lnSpc>
+                <a:spcPct val="150000"/>
+              </a:lnSpc>
+              <a:spcBef>
+                <a:spcPts val="0"/>
+              </a:spcBef>
+              <a:spcAft>
+                <a:spcPts val="0"/>
+              </a:spcAft>
+              <a:defRPr/>
+            </a:pPr>
+            <a:r>
+              <a:rPr lang="en-US" sz="2000" dirty="0" smtClean="0">
+                <a:solidFill>
+                  <a:schemeClr val="bg1"/>
+                </a:solidFill>
+                <a:latin typeface="Segoe UI" panose="020B0502040204020203" pitchFamily="34" charset="0"/>
+                <a:cs typeface="Segoe UI" panose="020B0502040204020203" pitchFamily="34" charset="0"/>
+              </a:rPr>
+              <a:t>Automated deployments</a:t>
+            </a:r>
+            <a:endParaRPr lang="en-US" sz="2000" dirty="0">
+              <a:solidFill>
+                <a:schemeClr val="bg1"/>
+              </a:solidFill>
+              <a:latin typeface="Segoe UI" panose="020B0502040204020203" pitchFamily="34" charset="0"/>
+              <a:cs typeface="Segoe UI" panose="020B0502040204020203" pitchFamily="34" charset="0"/>
+            </a:endParaRPr>
+          </a:p>
+        </p:txBody>
+      </p:sp>
     </p:spTree>
     <p:extLst>
       <p:ext uri="{BB962C8B-B14F-4D97-AF65-F5344CB8AC3E}">
@@ -35406,6 +35591,94 @@
                       </p:childTnLst>
                     </p:cTn>
                   </p:par>
+                  <p:par>
+                    <p:cTn id="7" fill="hold">
+                      <p:stCondLst>
+                        <p:cond delay="indefinite"/>
+                      </p:stCondLst>
+                      <p:childTnLst>
+                        <p:par>
+                          <p:cTn id="8" fill="hold">
+                            <p:stCondLst>
+                              <p:cond delay="0"/>
+                            </p:stCondLst>
+                            <p:childTnLst>
+                              <p:par>
+                                <p:cTn id="9" presetID="10" presetClass="entr" presetSubtype="0" fill="hold" grpId="0" nodeType="clickEffect">
+                                  <p:stCondLst>
+                                    <p:cond delay="0"/>
+                                  </p:stCondLst>
+                                  <p:childTnLst>
+                                    <p:set>
+                                      <p:cBhvr>
+                                        <p:cTn id="10" dur="1" fill="hold">
+                                          <p:stCondLst>
+                                            <p:cond delay="0"/>
+                                          </p:stCondLst>
+                                        </p:cTn>
+                                        <p:tgtEl>
+                                          <p:spTgt spid="6"/>
+                                        </p:tgtEl>
+                                        <p:attrNameLst>
+                                          <p:attrName>style.visibility</p:attrName>
+                                        </p:attrNameLst>
+                                      </p:cBhvr>
+                                      <p:to>
+                                        <p:strVal val="visible"/>
+                                      </p:to>
+                                    </p:set>
+                                    <p:animEffect transition="in" filter="fade">
+                                      <p:cBhvr>
+                                        <p:cTn id="11" dur="500"/>
+                                        <p:tgtEl>
+                                          <p:spTgt spid="6"/>
+                                        </p:tgtEl>
+                                      </p:cBhvr>
+                                    </p:animEffect>
+                                  </p:childTnLst>
+                                </p:cTn>
+                              </p:par>
+                              <p:par>
+                                <p:cTn id="12" presetID="10" presetClass="exit" presetSubtype="0" fill="hold" grpId="0" nodeType="withEffect">
+                                  <p:stCondLst>
+                                    <p:cond delay="0"/>
+                                  </p:stCondLst>
+                                  <p:childTnLst>
+                                    <p:animEffect transition="out" filter="fade">
+                                      <p:cBhvr>
+                                        <p:cTn id="13" dur="500"/>
+                                        <p:tgtEl>
+                                          <p:spTgt spid="2"/>
+                                        </p:tgtEl>
+                                      </p:cBhvr>
+                                    </p:animEffect>
+                                    <p:set>
+                                      <p:cBhvr>
+                                        <p:cTn id="14" dur="1" fill="hold">
+                                          <p:stCondLst>
+                                            <p:cond delay="499"/>
+                                          </p:stCondLst>
+                                        </p:cTn>
+                                        <p:tgtEl>
+                                          <p:spTgt spid="2"/>
+                                        </p:tgtEl>
+                                        <p:attrNameLst>
+                                          <p:attrName>style.visibility</p:attrName>
+                                        </p:attrNameLst>
+                                      </p:cBhvr>
+                                      <p:to>
+                                        <p:strVal val="hidden"/>
+                                      </p:to>
+                                    </p:set>
+                                  </p:childTnLst>
+                                </p:cTn>
+                              </p:par>
+                            </p:childTnLst>
+                          </p:cTn>
+                        </p:par>
+                      </p:childTnLst>
+                    </p:cTn>
+                  </p:par>
                 </p:childTnLst>
               </p:cTn>
               <p:prevCondLst>
@@ -35425,6 +35698,345 @@
             </p:seq>
           </p:childTnLst>
         </p:cTn>
+      </p:par>
+    </p:tnLst>
+    <p:bldLst>
+      <p:bldP spid="2" grpId="0"/>
+      <p:bldP spid="6" grpId="0"/>
+    </p:bldLst>
+  </p:timing>
+</p:sld>
+</file>
+
+<file path=ppt/slides/slide50.xml><?xml version="1.0" encoding="utf-8"?>
+<p:sld xmlns:a="http://schemas.openxmlformats.org/drawingml/2006/main" xmlns:r="http://schemas.openxmlformats.org/officeDocument/2006/relationships" xmlns:p="http://schemas.openxmlformats.org/presentationml/2006/main">
+  <p:cSld>
+    <p:spTree>
+      <p:nvGrpSpPr>
+        <p:cNvPr id="1" name=""/>
+        <p:cNvGrpSpPr/>
+        <p:nvPr/>
+      </p:nvGrpSpPr>
+      <p:grpSpPr>
+        <a:xfrm>
+          <a:off x="0" y="0"/>
+          <a:ext cx="0" cy="0"/>
+          <a:chOff x="0" y="0"/>
+          <a:chExt cx="0" cy="0"/>
+        </a:xfrm>
+      </p:grpSpPr>
+      <p:pic>
+        <p:nvPicPr>
+          <p:cNvPr id="2" name="Picture 1"/>
+          <p:cNvPicPr>
+            <a:picLocks noChangeAspect="1"/>
+          </p:cNvPicPr>
+          <p:nvPr/>
+        </p:nvPicPr>
+        <p:blipFill>
+          <a:blip r:embed="rId2">
+            <a:extLst>
+              <a:ext uri="{28A0092B-C50C-407E-A947-70E740481C1C}">
+                <a14:useLocalDpi xmlns:a14="http://schemas.microsoft.com/office/drawing/2010/main" val="0"/>
+              </a:ext>
+            </a:extLst>
+          </a:blip>
+          <a:stretch>
+            <a:fillRect/>
+          </a:stretch>
+        </p:blipFill>
+        <p:spPr>
+          <a:xfrm>
+            <a:off x="0" y="622761"/>
+            <a:ext cx="12192000" cy="5612477"/>
+          </a:xfrm>
+          <a:prstGeom prst="rect">
+            <a:avLst/>
+          </a:prstGeom>
+        </p:spPr>
+      </p:pic>
+    </p:spTree>
+    <p:extLst>
+      <p:ext uri="{BB962C8B-B14F-4D97-AF65-F5344CB8AC3E}">
+        <p14:creationId xmlns:p14="http://schemas.microsoft.com/office/powerpoint/2010/main" val="2426935568"/>
+      </p:ext>
+    </p:extLst>
+  </p:cSld>
+  <p:clrMapOvr>
+    <a:masterClrMapping/>
+  </p:clrMapOvr>
+  <p:timing>
+    <p:tnLst>
+      <p:par>
+        <p:cTn id="1" dur="indefinite" restart="never" nodeType="tmRoot"/>
+      </p:par>
+    </p:tnLst>
+  </p:timing>
+</p:sld>
+</file>
+
+<file path=ppt/slides/slide51.xml><?xml version="1.0" encoding="utf-8"?>
+<p:sld xmlns:a="http://schemas.openxmlformats.org/drawingml/2006/main" xmlns:r="http://schemas.openxmlformats.org/officeDocument/2006/relationships" xmlns:p="http://schemas.openxmlformats.org/presentationml/2006/main">
+  <p:cSld>
+    <p:spTree>
+      <p:nvGrpSpPr>
+        <p:cNvPr id="1" name=""/>
+        <p:cNvGrpSpPr/>
+        <p:nvPr/>
+      </p:nvGrpSpPr>
+      <p:grpSpPr>
+        <a:xfrm>
+          <a:off x="0" y="0"/>
+          <a:ext cx="0" cy="0"/>
+          <a:chOff x="0" y="0"/>
+          <a:chExt cx="0" cy="0"/>
+        </a:xfrm>
+      </p:grpSpPr>
+      <p:pic>
+        <p:nvPicPr>
+          <p:cNvPr id="3" name="Picture 2"/>
+          <p:cNvPicPr>
+            <a:picLocks noChangeAspect="1"/>
+          </p:cNvPicPr>
+          <p:nvPr/>
+        </p:nvPicPr>
+        <p:blipFill>
+          <a:blip r:embed="rId2">
+            <a:extLst>
+              <a:ext uri="{28A0092B-C50C-407E-A947-70E740481C1C}">
+                <a14:useLocalDpi xmlns:a14="http://schemas.microsoft.com/office/drawing/2010/main" val="0"/>
+              </a:ext>
+            </a:extLst>
+          </a:blip>
+          <a:stretch>
+            <a:fillRect/>
+          </a:stretch>
+        </p:blipFill>
+        <p:spPr>
+          <a:xfrm>
+            <a:off x="0" y="622761"/>
+            <a:ext cx="12192000" cy="5612477"/>
+          </a:xfrm>
+          <a:prstGeom prst="rect">
+            <a:avLst/>
+          </a:prstGeom>
+        </p:spPr>
+      </p:pic>
+    </p:spTree>
+    <p:extLst>
+      <p:ext uri="{BB962C8B-B14F-4D97-AF65-F5344CB8AC3E}">
+        <p14:creationId xmlns:p14="http://schemas.microsoft.com/office/powerpoint/2010/main" val="1197628705"/>
+      </p:ext>
+    </p:extLst>
+  </p:cSld>
+  <p:clrMapOvr>
+    <a:masterClrMapping/>
+  </p:clrMapOvr>
+  <p:timing>
+    <p:tnLst>
+      <p:par>
+        <p:cTn id="1" dur="indefinite" restart="never" nodeType="tmRoot"/>
+      </p:par>
+    </p:tnLst>
+  </p:timing>
+</p:sld>
+</file>
+
+<file path=ppt/slides/slide52.xml><?xml version="1.0" encoding="utf-8"?>
+<p:sld xmlns:a="http://schemas.openxmlformats.org/drawingml/2006/main" xmlns:r="http://schemas.openxmlformats.org/officeDocument/2006/relationships" xmlns:p="http://schemas.openxmlformats.org/presentationml/2006/main">
+  <p:cSld>
+    <p:spTree>
+      <p:nvGrpSpPr>
+        <p:cNvPr id="1" name=""/>
+        <p:cNvGrpSpPr/>
+        <p:nvPr/>
+      </p:nvGrpSpPr>
+      <p:grpSpPr>
+        <a:xfrm>
+          <a:off x="0" y="0"/>
+          <a:ext cx="0" cy="0"/>
+          <a:chOff x="0" y="0"/>
+          <a:chExt cx="0" cy="0"/>
+        </a:xfrm>
+      </p:grpSpPr>
+      <p:pic>
+        <p:nvPicPr>
+          <p:cNvPr id="2" name="Picture 1"/>
+          <p:cNvPicPr>
+            <a:picLocks noChangeAspect="1"/>
+          </p:cNvPicPr>
+          <p:nvPr/>
+        </p:nvPicPr>
+        <p:blipFill>
+          <a:blip r:embed="rId2">
+            <a:extLst>
+              <a:ext uri="{28A0092B-C50C-407E-A947-70E740481C1C}">
+                <a14:useLocalDpi xmlns:a14="http://schemas.microsoft.com/office/drawing/2010/main" val="0"/>
+              </a:ext>
+            </a:extLst>
+          </a:blip>
+          <a:stretch>
+            <a:fillRect/>
+          </a:stretch>
+        </p:blipFill>
+        <p:spPr>
+          <a:xfrm>
+            <a:off x="0" y="622761"/>
+            <a:ext cx="12192000" cy="5612477"/>
+          </a:xfrm>
+          <a:prstGeom prst="rect">
+            <a:avLst/>
+          </a:prstGeom>
+        </p:spPr>
+      </p:pic>
+    </p:spTree>
+    <p:extLst>
+      <p:ext uri="{BB962C8B-B14F-4D97-AF65-F5344CB8AC3E}">
+        <p14:creationId xmlns:p14="http://schemas.microsoft.com/office/powerpoint/2010/main" val="2052468487"/>
+      </p:ext>
+    </p:extLst>
+  </p:cSld>
+  <p:clrMapOvr>
+    <a:masterClrMapping/>
+  </p:clrMapOvr>
+  <p:timing>
+    <p:tnLst>
+      <p:par>
+        <p:cTn id="1" dur="indefinite" restart="never" nodeType="tmRoot"/>
+      </p:par>
+    </p:tnLst>
+  </p:timing>
+</p:sld>
+</file>
+
+<file path=ppt/slides/slide53.xml><?xml version="1.0" encoding="utf-8"?>
+<p:sld xmlns:a="http://schemas.openxmlformats.org/drawingml/2006/main" xmlns:r="http://schemas.openxmlformats.org/officeDocument/2006/relationships" xmlns:p="http://schemas.openxmlformats.org/presentationml/2006/main">
+  <p:cSld>
+    <p:spTree>
+      <p:nvGrpSpPr>
+        <p:cNvPr id="1" name=""/>
+        <p:cNvGrpSpPr/>
+        <p:nvPr/>
+      </p:nvGrpSpPr>
+      <p:grpSpPr>
+        <a:xfrm>
+          <a:off x="0" y="0"/>
+          <a:ext cx="0" cy="0"/>
+          <a:chOff x="0" y="0"/>
+          <a:chExt cx="0" cy="0"/>
+        </a:xfrm>
+      </p:grpSpPr>
+      <p:pic>
+        <p:nvPicPr>
+          <p:cNvPr id="3" name="Picture 2"/>
+          <p:cNvPicPr>
+            <a:picLocks noChangeAspect="1"/>
+          </p:cNvPicPr>
+          <p:nvPr/>
+        </p:nvPicPr>
+        <p:blipFill>
+          <a:blip r:embed="rId2">
+            <a:extLst>
+              <a:ext uri="{28A0092B-C50C-407E-A947-70E740481C1C}">
+                <a14:useLocalDpi xmlns:a14="http://schemas.microsoft.com/office/drawing/2010/main" val="0"/>
+              </a:ext>
+            </a:extLst>
+          </a:blip>
+          <a:stretch>
+            <a:fillRect/>
+          </a:stretch>
+        </p:blipFill>
+        <p:spPr>
+          <a:xfrm>
+            <a:off x="0" y="622761"/>
+            <a:ext cx="12192000" cy="5612477"/>
+          </a:xfrm>
+          <a:prstGeom prst="rect">
+            <a:avLst/>
+          </a:prstGeom>
+        </p:spPr>
+      </p:pic>
+    </p:spTree>
+    <p:extLst>
+      <p:ext uri="{BB962C8B-B14F-4D97-AF65-F5344CB8AC3E}">
+        <p14:creationId xmlns:p14="http://schemas.microsoft.com/office/powerpoint/2010/main" val="3258608044"/>
+      </p:ext>
+    </p:extLst>
+  </p:cSld>
+  <p:clrMapOvr>
+    <a:masterClrMapping/>
+  </p:clrMapOvr>
+  <p:timing>
+    <p:tnLst>
+      <p:par>
+        <p:cTn id="1" dur="indefinite" restart="never" nodeType="tmRoot"/>
+      </p:par>
+    </p:tnLst>
+  </p:timing>
+</p:sld>
+</file>
+
+<file path=ppt/slides/slide54.xml><?xml version="1.0" encoding="utf-8"?>
+<p:sld xmlns:a="http://schemas.openxmlformats.org/drawingml/2006/main" xmlns:r="http://schemas.openxmlformats.org/officeDocument/2006/relationships" xmlns:p="http://schemas.openxmlformats.org/presentationml/2006/main">
+  <p:cSld>
+    <p:spTree>
+      <p:nvGrpSpPr>
+        <p:cNvPr id="1" name=""/>
+        <p:cNvGrpSpPr/>
+        <p:nvPr/>
+      </p:nvGrpSpPr>
+      <p:grpSpPr>
+        <a:xfrm>
+          <a:off x="0" y="0"/>
+          <a:ext cx="0" cy="0"/>
+          <a:chOff x="0" y="0"/>
+          <a:chExt cx="0" cy="0"/>
+        </a:xfrm>
+      </p:grpSpPr>
+      <p:pic>
+        <p:nvPicPr>
+          <p:cNvPr id="2" name="Picture 1"/>
+          <p:cNvPicPr>
+            <a:picLocks noChangeAspect="1"/>
+          </p:cNvPicPr>
+          <p:nvPr/>
+        </p:nvPicPr>
+        <p:blipFill>
+          <a:blip r:embed="rId2">
+            <a:extLst>
+              <a:ext uri="{28A0092B-C50C-407E-A947-70E740481C1C}">
+                <a14:useLocalDpi xmlns:a14="http://schemas.microsoft.com/office/drawing/2010/main" val="0"/>
+              </a:ext>
+            </a:extLst>
+          </a:blip>
+          <a:stretch>
+            <a:fillRect/>
+          </a:stretch>
+        </p:blipFill>
+        <p:spPr>
+          <a:xfrm>
+            <a:off x="0" y="622761"/>
+            <a:ext cx="12192000" cy="5612477"/>
+          </a:xfrm>
+          <a:prstGeom prst="rect">
+            <a:avLst/>
+          </a:prstGeom>
+        </p:spPr>
+      </p:pic>
+    </p:spTree>
+    <p:extLst>
+      <p:ext uri="{BB962C8B-B14F-4D97-AF65-F5344CB8AC3E}">
+        <p14:creationId xmlns:p14="http://schemas.microsoft.com/office/powerpoint/2010/main" val="3519799397"/>
+      </p:ext>
+    </p:extLst>
+  </p:cSld>
+  <p:clrMapOvr>
+    <a:masterClrMapping/>
+  </p:clrMapOvr>
+  <p:timing>
+    <p:tnLst>
+      <p:par>
+        <p:cTn id="1" dur="indefinite" restart="never" nodeType="tmRoot"/>
       </p:par>
     </p:tnLst>
   </p:timing>
@@ -38110,19 +38722,8 @@
                 <a:latin typeface="Segoe UI" panose="020B0502040204020203" pitchFamily="34" charset="0"/>
                 <a:cs typeface="Segoe UI" panose="020B0502040204020203" pitchFamily="34" charset="0"/>
               </a:rPr>
-              <a:t>If </a:t>
-            </a:r>
-            <a:r>
-              <a:rPr lang="en-US" sz="1800" dirty="0" smtClean="0">
-                <a:latin typeface="Segoe UI" panose="020B0502040204020203" pitchFamily="34" charset="0"/>
-                <a:cs typeface="Segoe UI" panose="020B0502040204020203" pitchFamily="34" charset="0"/>
-              </a:rPr>
-              <a:t>you don’t believe in concepts like “Big Design Up Front”</a:t>
-            </a:r>
-            <a:endParaRPr lang="en-US" sz="1800" dirty="0" smtClean="0">
-              <a:latin typeface="Segoe UI" panose="020B0502040204020203" pitchFamily="34" charset="0"/>
-              <a:cs typeface="Segoe UI" panose="020B0502040204020203" pitchFamily="34" charset="0"/>
-            </a:endParaRPr>
+              <a:t>If you don’t believe in concepts like “Big Design Up Front”</a:t>
+            </a:r>
           </a:p>
           <a:p>
             <a:pPr lvl="1">
@@ -38184,19 +38785,8 @@
                 <a:latin typeface="Segoe UI" panose="020B0502040204020203" pitchFamily="34" charset="0"/>
                 <a:cs typeface="Segoe UI" panose="020B0502040204020203" pitchFamily="34" charset="0"/>
               </a:rPr>
-              <a:t>Service integration testing is </a:t>
-            </a:r>
-            <a:r>
-              <a:rPr lang="en-US" sz="1800" dirty="0" smtClean="0">
-                <a:latin typeface="Segoe UI" panose="020B0502040204020203" pitchFamily="34" charset="0"/>
-                <a:cs typeface="Segoe UI" panose="020B0502040204020203" pitchFamily="34" charset="0"/>
-              </a:rPr>
-              <a:t>challenging</a:t>
-            </a:r>
-            <a:endParaRPr lang="en-US" sz="1800" dirty="0" smtClean="0">
-              <a:latin typeface="Segoe UI" panose="020B0502040204020203" pitchFamily="34" charset="0"/>
-              <a:cs typeface="Segoe UI" panose="020B0502040204020203" pitchFamily="34" charset="0"/>
-            </a:endParaRPr>
+              <a:t>Service integration testing is challenging</a:t>
+            </a:r>
           </a:p>
         </p:txBody>
       </p:sp>

</xml_diff>